<commit_message>
Added scaling at ex1 presentation
</commit_message>
<xml_diff>
--- a/assig2/assig2-pres.pptx
+++ b/assig2/assig2-pres.pptx
@@ -16,7 +16,7 @@
     <p:sldId id="265" r:id="rId10"/>
     <p:sldId id="266" r:id="rId11"/>
     <p:sldId id="267" r:id="rId12"/>
-    <p:sldId id="268" r:id="rId13"/>
+    <p:sldId id="270" r:id="rId13"/>
     <p:sldId id="269" r:id="rId14"/>
   </p:sldIdLst>
   <p:sldSz cx="12192000" cy="6858000"/>
@@ -116,6 +116,11 @@
       </a:defRPr>
     </a:lvl9pPr>
   </p:defaultTextStyle>
+  <p:extLst>
+    <p:ext uri="{EFAFB233-063F-42B5-8137-9DF3F51BA10A}">
+      <p15:sldGuideLst xmlns:p15="http://schemas.microsoft.com/office/powerpoint/2012/main"/>
+    </p:ext>
+  </p:extLst>
 </p:presentation>
 </file>
 
@@ -250,7 +255,7 @@
           <a:p>
             <a:fld id="{FA0A5F52-6D2F-4552-B542-30C4C79E48C2}" type="datetimeFigureOut">
               <a:rPr lang="en-US" smtClean="0"/>
-              <a:t>11/16/2017</a:t>
+              <a:t>11/17/2017</a:t>
             </a:fld>
             <a:endParaRPr lang="en-US"/>
           </a:p>
@@ -420,7 +425,7 @@
           <a:p>
             <a:fld id="{FA0A5F52-6D2F-4552-B542-30C4C79E48C2}" type="datetimeFigureOut">
               <a:rPr lang="en-US" smtClean="0"/>
-              <a:t>11/16/2017</a:t>
+              <a:t>11/17/2017</a:t>
             </a:fld>
             <a:endParaRPr lang="en-US"/>
           </a:p>
@@ -600,7 +605,7 @@
           <a:p>
             <a:fld id="{FA0A5F52-6D2F-4552-B542-30C4C79E48C2}" type="datetimeFigureOut">
               <a:rPr lang="en-US" smtClean="0"/>
-              <a:t>11/16/2017</a:t>
+              <a:t>11/17/2017</a:t>
             </a:fld>
             <a:endParaRPr lang="en-US"/>
           </a:p>
@@ -770,7 +775,7 @@
           <a:p>
             <a:fld id="{FA0A5F52-6D2F-4552-B542-30C4C79E48C2}" type="datetimeFigureOut">
               <a:rPr lang="en-US" smtClean="0"/>
-              <a:t>11/16/2017</a:t>
+              <a:t>11/17/2017</a:t>
             </a:fld>
             <a:endParaRPr lang="en-US"/>
           </a:p>
@@ -1016,7 +1021,7 @@
           <a:p>
             <a:fld id="{FA0A5F52-6D2F-4552-B542-30C4C79E48C2}" type="datetimeFigureOut">
               <a:rPr lang="en-US" smtClean="0"/>
-              <a:t>11/16/2017</a:t>
+              <a:t>11/17/2017</a:t>
             </a:fld>
             <a:endParaRPr lang="en-US"/>
           </a:p>
@@ -1248,7 +1253,7 @@
           <a:p>
             <a:fld id="{FA0A5F52-6D2F-4552-B542-30C4C79E48C2}" type="datetimeFigureOut">
               <a:rPr lang="en-US" smtClean="0"/>
-              <a:t>11/16/2017</a:t>
+              <a:t>11/17/2017</a:t>
             </a:fld>
             <a:endParaRPr lang="en-US"/>
           </a:p>
@@ -1615,7 +1620,7 @@
           <a:p>
             <a:fld id="{FA0A5F52-6D2F-4552-B542-30C4C79E48C2}" type="datetimeFigureOut">
               <a:rPr lang="en-US" smtClean="0"/>
-              <a:t>11/16/2017</a:t>
+              <a:t>11/17/2017</a:t>
             </a:fld>
             <a:endParaRPr lang="en-US"/>
           </a:p>
@@ -1733,7 +1738,7 @@
           <a:p>
             <a:fld id="{FA0A5F52-6D2F-4552-B542-30C4C79E48C2}" type="datetimeFigureOut">
               <a:rPr lang="en-US" smtClean="0"/>
-              <a:t>11/16/2017</a:t>
+              <a:t>11/17/2017</a:t>
             </a:fld>
             <a:endParaRPr lang="en-US"/>
           </a:p>
@@ -1828,7 +1833,7 @@
           <a:p>
             <a:fld id="{FA0A5F52-6D2F-4552-B542-30C4C79E48C2}" type="datetimeFigureOut">
               <a:rPr lang="en-US" smtClean="0"/>
-              <a:t>11/16/2017</a:t>
+              <a:t>11/17/2017</a:t>
             </a:fld>
             <a:endParaRPr lang="en-US"/>
           </a:p>
@@ -2105,7 +2110,7 @@
           <a:p>
             <a:fld id="{FA0A5F52-6D2F-4552-B542-30C4C79E48C2}" type="datetimeFigureOut">
               <a:rPr lang="en-US" smtClean="0"/>
-              <a:t>11/16/2017</a:t>
+              <a:t>11/17/2017</a:t>
             </a:fld>
             <a:endParaRPr lang="en-US"/>
           </a:p>
@@ -2358,7 +2363,7 @@
           <a:p>
             <a:fld id="{FA0A5F52-6D2F-4552-B542-30C4C79E48C2}" type="datetimeFigureOut">
               <a:rPr lang="en-US" smtClean="0"/>
-              <a:t>11/16/2017</a:t>
+              <a:t>11/17/2017</a:t>
             </a:fld>
             <a:endParaRPr lang="en-US"/>
           </a:p>
@@ -2571,7 +2576,7 @@
           <a:p>
             <a:fld id="{FA0A5F52-6D2F-4552-B542-30C4C79E48C2}" type="datetimeFigureOut">
               <a:rPr lang="en-US" smtClean="0"/>
-              <a:t>11/16/2017</a:t>
+              <a:t>11/17/2017</a:t>
             </a:fld>
             <a:endParaRPr lang="en-US"/>
           </a:p>
@@ -3038,6 +3043,13 @@
   <p:clrMapOvr>
     <a:masterClrMapping/>
   </p:clrMapOvr>
+  <p:timing>
+    <p:tnLst>
+      <p:par>
+        <p:cTn id="1" dur="indefinite" restart="never" nodeType="tmRoot"/>
+      </p:par>
+    </p:tnLst>
+  </p:timing>
 </p:sld>
 </file>
 
@@ -3096,10 +3108,596 @@
           <a:bodyPr/>
           <a:lstStyle/>
           <a:p>
-            <a:endParaRPr lang="en-US"/>
-          </a:p>
-        </p:txBody>
-      </p:sp>
+            <a:r>
+              <a:rPr lang="en-US" dirty="0" smtClean="0"/>
+              <a:t>Weak scaling:</a:t>
+            </a:r>
+          </a:p>
+          <a:p>
+            <a:pPr lvl="1"/>
+            <a:r>
+              <a:rPr lang="en-US" dirty="0" smtClean="0"/>
+              <a:t>n = 1 000 000</a:t>
+            </a:r>
+          </a:p>
+          <a:p>
+            <a:endParaRPr lang="en-US" dirty="0"/>
+          </a:p>
+          <a:p>
+            <a:endParaRPr lang="en-US" dirty="0" smtClean="0"/>
+          </a:p>
+          <a:p>
+            <a:r>
+              <a:rPr lang="en-US" dirty="0" smtClean="0"/>
+              <a:t>Strong scaling: </a:t>
+            </a:r>
+          </a:p>
+          <a:p>
+            <a:pPr lvl="1"/>
+            <a:r>
+              <a:rPr lang="en-US" dirty="0" smtClean="0"/>
+              <a:t>n = 10 000 000.</a:t>
+            </a:r>
+          </a:p>
+          <a:p>
+            <a:pPr lvl="1"/>
+            <a:endParaRPr lang="en-US" dirty="0"/>
+          </a:p>
+        </p:txBody>
+      </p:sp>
+      <p:graphicFrame>
+        <p:nvGraphicFramePr>
+          <p:cNvPr id="4" name="Table 3"/>
+          <p:cNvGraphicFramePr>
+            <a:graphicFrameLocks noGrp="1"/>
+          </p:cNvGraphicFramePr>
+          <p:nvPr>
+            <p:extLst>
+              <p:ext uri="{D42A27DB-BD31-4B8C-83A1-F6EECF244321}">
+                <p14:modId xmlns:p14="http://schemas.microsoft.com/office/powerpoint/2010/main" val="3793266259"/>
+              </p:ext>
+            </p:extLst>
+          </p:nvPr>
+        </p:nvGraphicFramePr>
+        <p:xfrm>
+          <a:off x="1619116" y="4967411"/>
+          <a:ext cx="8953768" cy="741680"/>
+        </p:xfrm>
+        <a:graphic>
+          <a:graphicData uri="http://schemas.openxmlformats.org/drawingml/2006/table">
+            <a:tbl>
+              <a:tblPr firstRow="1" bandRow="1">
+                <a:tableStyleId>{5C22544A-7EE6-4342-B048-85BDC9FD1C3A}</a:tableStyleId>
+              </a:tblPr>
+              <a:tblGrid>
+                <a:gridCol w="2340838"/>
+                <a:gridCol w="1322586"/>
+                <a:gridCol w="1322586"/>
+                <a:gridCol w="1322586"/>
+                <a:gridCol w="1322586"/>
+                <a:gridCol w="1322586"/>
+              </a:tblGrid>
+              <a:tr h="370840">
+                <a:tc>
+                  <a:txBody>
+                    <a:bodyPr/>
+                    <a:lstStyle/>
+                    <a:p>
+                      <a:r>
+                        <a:rPr lang="en-US" dirty="0" smtClean="0"/>
+                        <a:t>No.</a:t>
+                      </a:r>
+                      <a:r>
+                        <a:rPr lang="en-US" baseline="0" dirty="0" smtClean="0"/>
+                        <a:t> of threads</a:t>
+                      </a:r>
+                      <a:endParaRPr lang="en-US" dirty="0"/>
+                    </a:p>
+                  </a:txBody>
+                  <a:tcPr/>
+                </a:tc>
+                <a:tc>
+                  <a:txBody>
+                    <a:bodyPr/>
+                    <a:lstStyle/>
+                    <a:p>
+                      <a:pPr algn="ctr"/>
+                      <a:r>
+                        <a:rPr lang="en-US" dirty="0" smtClean="0"/>
+                        <a:t>16</a:t>
+                      </a:r>
+                      <a:endParaRPr lang="en-US" dirty="0"/>
+                    </a:p>
+                  </a:txBody>
+                  <a:tcPr/>
+                </a:tc>
+                <a:tc>
+                  <a:txBody>
+                    <a:bodyPr/>
+                    <a:lstStyle/>
+                    <a:p>
+                      <a:pPr algn="ctr"/>
+                      <a:r>
+                        <a:rPr lang="en-US" dirty="0" smtClean="0"/>
+                        <a:t>32</a:t>
+                      </a:r>
+                      <a:endParaRPr lang="en-US" dirty="0"/>
+                    </a:p>
+                  </a:txBody>
+                  <a:tcPr/>
+                </a:tc>
+                <a:tc>
+                  <a:txBody>
+                    <a:bodyPr/>
+                    <a:lstStyle/>
+                    <a:p>
+                      <a:pPr algn="ctr"/>
+                      <a:r>
+                        <a:rPr lang="en-US" dirty="0" smtClean="0"/>
+                        <a:t>64</a:t>
+                      </a:r>
+                      <a:endParaRPr lang="en-US" dirty="0"/>
+                    </a:p>
+                  </a:txBody>
+                  <a:tcPr/>
+                </a:tc>
+                <a:tc>
+                  <a:txBody>
+                    <a:bodyPr/>
+                    <a:lstStyle/>
+                    <a:p>
+                      <a:pPr algn="ctr"/>
+                      <a:r>
+                        <a:rPr lang="en-US" dirty="0" smtClean="0"/>
+                        <a:t>128</a:t>
+                      </a:r>
+                      <a:endParaRPr lang="en-US" dirty="0"/>
+                    </a:p>
+                  </a:txBody>
+                  <a:tcPr/>
+                </a:tc>
+                <a:tc>
+                  <a:txBody>
+                    <a:bodyPr/>
+                    <a:lstStyle/>
+                    <a:p>
+                      <a:pPr algn="ctr"/>
+                      <a:r>
+                        <a:rPr lang="en-US" dirty="0" smtClean="0"/>
+                        <a:t>256</a:t>
+                      </a:r>
+                      <a:endParaRPr lang="en-US" dirty="0"/>
+                    </a:p>
+                  </a:txBody>
+                  <a:tcPr/>
+                </a:tc>
+              </a:tr>
+              <a:tr h="370840">
+                <a:tc>
+                  <a:txBody>
+                    <a:bodyPr/>
+                    <a:lstStyle/>
+                    <a:p>
+                      <a:r>
+                        <a:rPr lang="en-US" dirty="0" smtClean="0"/>
+                        <a:t>Execution time (</a:t>
+                      </a:r>
+                      <a:r>
+                        <a:rPr lang="en-US" dirty="0" err="1" smtClean="0"/>
+                        <a:t>ms</a:t>
+                      </a:r>
+                      <a:r>
+                        <a:rPr lang="en-US" dirty="0" smtClean="0"/>
+                        <a:t>)</a:t>
+                      </a:r>
+                      <a:endParaRPr lang="en-US" dirty="0"/>
+                    </a:p>
+                  </a:txBody>
+                  <a:tcPr/>
+                </a:tc>
+                <a:tc>
+                  <a:txBody>
+                    <a:bodyPr/>
+                    <a:lstStyle/>
+                    <a:p>
+                      <a:pPr algn="ctr"/>
+                      <a:r>
+                        <a:rPr lang="en-US" sz="1800" kern="1200" dirty="0" smtClean="0">
+                          <a:solidFill>
+                            <a:schemeClr val="dk1"/>
+                          </a:solidFill>
+                          <a:latin typeface="+mn-lt"/>
+                          <a:ea typeface="+mn-ea"/>
+                          <a:cs typeface="+mn-cs"/>
+                        </a:rPr>
+                        <a:t>7304</a:t>
+                      </a:r>
+                      <a:endParaRPr lang="en-US" dirty="0"/>
+                    </a:p>
+                  </a:txBody>
+                  <a:tcPr/>
+                </a:tc>
+                <a:tc>
+                  <a:txBody>
+                    <a:bodyPr/>
+                    <a:lstStyle/>
+                    <a:p>
+                      <a:pPr algn="ctr"/>
+                      <a:r>
+                        <a:rPr lang="en-US" sz="1800" kern="1200" dirty="0" smtClean="0">
+                          <a:solidFill>
+                            <a:schemeClr val="dk1"/>
+                          </a:solidFill>
+                          <a:latin typeface="+mn-lt"/>
+                          <a:ea typeface="+mn-ea"/>
+                          <a:cs typeface="+mn-cs"/>
+                        </a:rPr>
+                        <a:t>7390</a:t>
+                      </a:r>
+                      <a:endParaRPr lang="en-US" dirty="0"/>
+                    </a:p>
+                  </a:txBody>
+                  <a:tcPr/>
+                </a:tc>
+                <a:tc>
+                  <a:txBody>
+                    <a:bodyPr/>
+                    <a:lstStyle/>
+                    <a:p>
+                      <a:pPr marL="0" marR="0" lvl="0" indent="0" algn="ctr" defTabSz="914400" rtl="0" eaLnBrk="1" fontAlgn="auto" latinLnBrk="0" hangingPunct="1">
+                        <a:lnSpc>
+                          <a:spcPct val="100000"/>
+                        </a:lnSpc>
+                        <a:spcBef>
+                          <a:spcPts val="0"/>
+                        </a:spcBef>
+                        <a:spcAft>
+                          <a:spcPts val="0"/>
+                        </a:spcAft>
+                        <a:buClrTx/>
+                        <a:buSzTx/>
+                        <a:buFontTx/>
+                        <a:buNone/>
+                        <a:tabLst/>
+                        <a:defRPr/>
+                      </a:pPr>
+                      <a:r>
+                        <a:rPr lang="en-US" sz="1800" kern="1200" dirty="0" smtClean="0">
+                          <a:solidFill>
+                            <a:schemeClr val="dk1"/>
+                          </a:solidFill>
+                          <a:latin typeface="+mn-lt"/>
+                          <a:ea typeface="+mn-ea"/>
+                          <a:cs typeface="+mn-cs"/>
+                        </a:rPr>
+                        <a:t>7374</a:t>
+                      </a:r>
+                      <a:endParaRPr lang="en-US" sz="1800" kern="1200" dirty="0" smtClean="0">
+                        <a:solidFill>
+                          <a:schemeClr val="dk1"/>
+                        </a:solidFill>
+                        <a:latin typeface="+mn-lt"/>
+                        <a:ea typeface="+mn-ea"/>
+                        <a:cs typeface="+mn-cs"/>
+                      </a:endParaRPr>
+                    </a:p>
+                  </a:txBody>
+                  <a:tcPr/>
+                </a:tc>
+                <a:tc>
+                  <a:txBody>
+                    <a:bodyPr/>
+                    <a:lstStyle/>
+                    <a:p>
+                      <a:pPr algn="ctr"/>
+                      <a:r>
+                        <a:rPr lang="en-US" sz="1800" kern="1200" dirty="0" smtClean="0">
+                          <a:solidFill>
+                            <a:schemeClr val="dk1"/>
+                          </a:solidFill>
+                          <a:latin typeface="+mn-lt"/>
+                          <a:ea typeface="+mn-ea"/>
+                          <a:cs typeface="+mn-cs"/>
+                        </a:rPr>
+                        <a:t>7780</a:t>
+                      </a:r>
+                      <a:endParaRPr lang="en-US" dirty="0"/>
+                    </a:p>
+                  </a:txBody>
+                  <a:tcPr/>
+                </a:tc>
+                <a:tc>
+                  <a:txBody>
+                    <a:bodyPr/>
+                    <a:lstStyle/>
+                    <a:p>
+                      <a:pPr algn="ctr"/>
+                      <a:r>
+                        <a:rPr lang="en-US" sz="1800" kern="1200" dirty="0" smtClean="0">
+                          <a:solidFill>
+                            <a:schemeClr val="dk1"/>
+                          </a:solidFill>
+                          <a:latin typeface="+mn-lt"/>
+                          <a:ea typeface="+mn-ea"/>
+                          <a:cs typeface="+mn-cs"/>
+                        </a:rPr>
+                        <a:t>13523</a:t>
+                      </a:r>
+                      <a:endParaRPr lang="en-US" dirty="0"/>
+                    </a:p>
+                  </a:txBody>
+                  <a:tcPr/>
+                </a:tc>
+              </a:tr>
+            </a:tbl>
+          </a:graphicData>
+        </a:graphic>
+      </p:graphicFrame>
+      <p:graphicFrame>
+        <p:nvGraphicFramePr>
+          <p:cNvPr id="5" name="Table 4"/>
+          <p:cNvGraphicFramePr>
+            <a:graphicFrameLocks noGrp="1"/>
+          </p:cNvGraphicFramePr>
+          <p:nvPr>
+            <p:extLst>
+              <p:ext uri="{D42A27DB-BD31-4B8C-83A1-F6EECF244321}">
+                <p14:modId xmlns:p14="http://schemas.microsoft.com/office/powerpoint/2010/main" val="198889536"/>
+              </p:ext>
+            </p:extLst>
+          </p:nvPr>
+        </p:nvGraphicFramePr>
+        <p:xfrm>
+          <a:off x="1619116" y="2803996"/>
+          <a:ext cx="8953768" cy="741680"/>
+        </p:xfrm>
+        <a:graphic>
+          <a:graphicData uri="http://schemas.openxmlformats.org/drawingml/2006/table">
+            <a:tbl>
+              <a:tblPr firstRow="1" bandRow="1">
+                <a:tableStyleId>{5C22544A-7EE6-4342-B048-85BDC9FD1C3A}</a:tableStyleId>
+              </a:tblPr>
+              <a:tblGrid>
+                <a:gridCol w="2340838"/>
+                <a:gridCol w="1322586"/>
+                <a:gridCol w="1322586"/>
+                <a:gridCol w="1322586"/>
+                <a:gridCol w="1322586"/>
+                <a:gridCol w="1322586"/>
+              </a:tblGrid>
+              <a:tr h="370840">
+                <a:tc>
+                  <a:txBody>
+                    <a:bodyPr/>
+                    <a:lstStyle/>
+                    <a:p>
+                      <a:r>
+                        <a:rPr lang="en-US" dirty="0" smtClean="0"/>
+                        <a:t>N/No.</a:t>
+                      </a:r>
+                      <a:r>
+                        <a:rPr lang="en-US" baseline="0" dirty="0" smtClean="0"/>
+                        <a:t> of threads</a:t>
+                      </a:r>
+                      <a:endParaRPr lang="en-US" dirty="0"/>
+                    </a:p>
+                  </a:txBody>
+                  <a:tcPr/>
+                </a:tc>
+                <a:tc>
+                  <a:txBody>
+                    <a:bodyPr/>
+                    <a:lstStyle/>
+                    <a:p>
+                      <a:pPr algn="ctr"/>
+                      <a:r>
+                        <a:rPr lang="en-US" dirty="0" smtClean="0"/>
+                        <a:t>n/16</a:t>
+                      </a:r>
+                      <a:endParaRPr lang="en-US" dirty="0"/>
+                    </a:p>
+                  </a:txBody>
+                  <a:tcPr/>
+                </a:tc>
+                <a:tc>
+                  <a:txBody>
+                    <a:bodyPr/>
+                    <a:lstStyle/>
+                    <a:p>
+                      <a:pPr algn="ctr"/>
+                      <a:r>
+                        <a:rPr lang="en-US" dirty="0" smtClean="0"/>
+                        <a:t>2n/32</a:t>
+                      </a:r>
+                      <a:endParaRPr lang="en-US" dirty="0"/>
+                    </a:p>
+                  </a:txBody>
+                  <a:tcPr/>
+                </a:tc>
+                <a:tc>
+                  <a:txBody>
+                    <a:bodyPr/>
+                    <a:lstStyle/>
+                    <a:p>
+                      <a:pPr algn="ctr"/>
+                      <a:r>
+                        <a:rPr lang="en-US" dirty="0" smtClean="0"/>
+                        <a:t>4n/64</a:t>
+                      </a:r>
+                      <a:endParaRPr lang="en-US" dirty="0"/>
+                    </a:p>
+                  </a:txBody>
+                  <a:tcPr/>
+                </a:tc>
+                <a:tc>
+                  <a:txBody>
+                    <a:bodyPr/>
+                    <a:lstStyle/>
+                    <a:p>
+                      <a:pPr algn="ctr"/>
+                      <a:r>
+                        <a:rPr lang="en-US" dirty="0" smtClean="0"/>
+                        <a:t>8n/128</a:t>
+                      </a:r>
+                      <a:endParaRPr lang="en-US" dirty="0"/>
+                    </a:p>
+                  </a:txBody>
+                  <a:tcPr/>
+                </a:tc>
+                <a:tc>
+                  <a:txBody>
+                    <a:bodyPr/>
+                    <a:lstStyle/>
+                    <a:p>
+                      <a:pPr algn="ctr"/>
+                      <a:r>
+                        <a:rPr lang="en-US" dirty="0" smtClean="0"/>
+                        <a:t>16n/256</a:t>
+                      </a:r>
+                      <a:endParaRPr lang="en-US" dirty="0"/>
+                    </a:p>
+                  </a:txBody>
+                  <a:tcPr/>
+                </a:tc>
+              </a:tr>
+              <a:tr h="370840">
+                <a:tc>
+                  <a:txBody>
+                    <a:bodyPr/>
+                    <a:lstStyle/>
+                    <a:p>
+                      <a:r>
+                        <a:rPr lang="en-US" dirty="0" smtClean="0"/>
+                        <a:t>Execution time (</a:t>
+                      </a:r>
+                      <a:r>
+                        <a:rPr lang="en-US" dirty="0" err="1" smtClean="0"/>
+                        <a:t>ms</a:t>
+                      </a:r>
+                      <a:r>
+                        <a:rPr lang="en-US" dirty="0" smtClean="0"/>
+                        <a:t>)</a:t>
+                      </a:r>
+                      <a:endParaRPr lang="en-US" dirty="0"/>
+                    </a:p>
+                  </a:txBody>
+                  <a:tcPr/>
+                </a:tc>
+                <a:tc>
+                  <a:txBody>
+                    <a:bodyPr/>
+                    <a:lstStyle/>
+                    <a:p>
+                      <a:pPr algn="ctr"/>
+                      <a:r>
+                        <a:rPr lang="en-US" sz="1800" kern="1200" dirty="0" smtClean="0">
+                          <a:solidFill>
+                            <a:schemeClr val="dk1"/>
+                          </a:solidFill>
+                          <a:latin typeface="+mn-lt"/>
+                          <a:ea typeface="+mn-ea"/>
+                          <a:cs typeface="+mn-cs"/>
+                        </a:rPr>
+                        <a:t>752</a:t>
+                      </a:r>
+                      <a:endParaRPr lang="en-US" dirty="0"/>
+                    </a:p>
+                  </a:txBody>
+                  <a:tcPr/>
+                </a:tc>
+                <a:tc>
+                  <a:txBody>
+                    <a:bodyPr/>
+                    <a:lstStyle/>
+                    <a:p>
+                      <a:pPr algn="ctr"/>
+                      <a:r>
+                        <a:rPr lang="en-US" sz="1800" kern="1200" dirty="0" smtClean="0">
+                          <a:solidFill>
+                            <a:schemeClr val="dk1"/>
+                          </a:solidFill>
+                          <a:latin typeface="+mn-lt"/>
+                          <a:ea typeface="+mn-ea"/>
+                          <a:cs typeface="+mn-cs"/>
+                        </a:rPr>
+                        <a:t>1452</a:t>
+                      </a:r>
+                      <a:endParaRPr lang="en-US" dirty="0"/>
+                    </a:p>
+                  </a:txBody>
+                  <a:tcPr/>
+                </a:tc>
+                <a:tc>
+                  <a:txBody>
+                    <a:bodyPr/>
+                    <a:lstStyle/>
+                    <a:p>
+                      <a:pPr algn="ctr"/>
+                      <a:r>
+                        <a:rPr lang="en-US" sz="1800" kern="1200" dirty="0" smtClean="0">
+                          <a:solidFill>
+                            <a:schemeClr val="dk1"/>
+                          </a:solidFill>
+                          <a:latin typeface="+mn-lt"/>
+                          <a:ea typeface="+mn-ea"/>
+                          <a:cs typeface="+mn-cs"/>
+                        </a:rPr>
+                        <a:t>2917</a:t>
+                      </a:r>
+                      <a:endParaRPr lang="en-US" dirty="0"/>
+                    </a:p>
+                  </a:txBody>
+                  <a:tcPr/>
+                </a:tc>
+                <a:tc>
+                  <a:txBody>
+                    <a:bodyPr/>
+                    <a:lstStyle/>
+                    <a:p>
+                      <a:pPr algn="ctr"/>
+                      <a:r>
+                        <a:rPr lang="en-US" sz="1800" kern="1200" dirty="0" smtClean="0">
+                          <a:solidFill>
+                            <a:schemeClr val="dk1"/>
+                          </a:solidFill>
+                          <a:latin typeface="+mn-lt"/>
+                          <a:ea typeface="+mn-ea"/>
+                          <a:cs typeface="+mn-cs"/>
+                        </a:rPr>
+                        <a:t>5920</a:t>
+                      </a:r>
+                      <a:endParaRPr lang="en-US" dirty="0"/>
+                    </a:p>
+                  </a:txBody>
+                  <a:tcPr/>
+                </a:tc>
+                <a:tc>
+                  <a:txBody>
+                    <a:bodyPr/>
+                    <a:lstStyle/>
+                    <a:p>
+                      <a:pPr algn="ctr"/>
+                      <a:r>
+                        <a:rPr lang="en-US" sz="1800" kern="1200" dirty="0" smtClean="0">
+                          <a:solidFill>
+                            <a:schemeClr val="dk1"/>
+                          </a:solidFill>
+                          <a:latin typeface="+mn-lt"/>
+                          <a:ea typeface="+mn-ea"/>
+                          <a:cs typeface="+mn-cs"/>
+                        </a:rPr>
+                        <a:t>19458</a:t>
+                      </a:r>
+                      <a:endParaRPr lang="en-US" dirty="0"/>
+                    </a:p>
+                  </a:txBody>
+                  <a:tcPr/>
+                </a:tc>
+              </a:tr>
+            </a:tbl>
+          </a:graphicData>
+        </a:graphic>
+      </p:graphicFrame>
     </p:spTree>
     <p:extLst>
       <p:ext uri="{BB962C8B-B14F-4D97-AF65-F5344CB8AC3E}">
@@ -3110,6 +3708,13 @@
   <p:clrMapOvr>
     <a:masterClrMapping/>
   </p:clrMapOvr>
+  <p:timing>
+    <p:tnLst>
+      <p:par>
+        <p:cTn id="1" dur="indefinite" restart="never" nodeType="tmRoot"/>
+      </p:par>
+    </p:tnLst>
+  </p:timing>
 </p:sld>
 </file>
 
@@ -3790,6 +4395,13 @@
   <p:clrMapOvr>
     <a:masterClrMapping/>
   </p:clrMapOvr>
+  <p:timing>
+    <p:tnLst>
+      <p:par>
+        <p:cTn id="1" dur="indefinite" restart="never" nodeType="tmRoot"/>
+      </p:par>
+    </p:tnLst>
+  </p:timing>
 </p:sld>
 </file>
 
@@ -3848,20 +4460,628 @@
           <a:bodyPr/>
           <a:lstStyle/>
           <a:p>
-            <a:endParaRPr lang="en-US"/>
-          </a:p>
-        </p:txBody>
-      </p:sp>
+            <a:r>
+              <a:rPr lang="en-US" dirty="0" smtClean="0"/>
+              <a:t>Weak scaling:</a:t>
+            </a:r>
+          </a:p>
+          <a:p>
+            <a:pPr lvl="1"/>
+            <a:r>
+              <a:rPr lang="en-US" dirty="0" smtClean="0"/>
+              <a:t>n = 1 000 000</a:t>
+            </a:r>
+          </a:p>
+          <a:p>
+            <a:endParaRPr lang="en-US" dirty="0"/>
+          </a:p>
+          <a:p>
+            <a:endParaRPr lang="en-US" dirty="0" smtClean="0"/>
+          </a:p>
+          <a:p>
+            <a:r>
+              <a:rPr lang="en-US" dirty="0" smtClean="0"/>
+              <a:t>Strong scaling: </a:t>
+            </a:r>
+          </a:p>
+          <a:p>
+            <a:pPr lvl="1"/>
+            <a:r>
+              <a:rPr lang="en-US" dirty="0" smtClean="0"/>
+              <a:t>n = 10 000 000.</a:t>
+            </a:r>
+          </a:p>
+          <a:p>
+            <a:pPr lvl="1"/>
+            <a:endParaRPr lang="en-US" dirty="0"/>
+          </a:p>
+        </p:txBody>
+      </p:sp>
+      <p:graphicFrame>
+        <p:nvGraphicFramePr>
+          <p:cNvPr id="5" name="Table 4"/>
+          <p:cNvGraphicFramePr>
+            <a:graphicFrameLocks noGrp="1"/>
+          </p:cNvGraphicFramePr>
+          <p:nvPr>
+            <p:extLst>
+              <p:ext uri="{D42A27DB-BD31-4B8C-83A1-F6EECF244321}">
+                <p14:modId xmlns:p14="http://schemas.microsoft.com/office/powerpoint/2010/main" val="1746667613"/>
+              </p:ext>
+            </p:extLst>
+          </p:nvPr>
+        </p:nvGraphicFramePr>
+        <p:xfrm>
+          <a:off x="1619116" y="2803996"/>
+          <a:ext cx="8953768" cy="741680"/>
+        </p:xfrm>
+        <a:graphic>
+          <a:graphicData uri="http://schemas.openxmlformats.org/drawingml/2006/table">
+            <a:tbl>
+              <a:tblPr firstRow="1" bandRow="1">
+                <a:tableStyleId>{5C22544A-7EE6-4342-B048-85BDC9FD1C3A}</a:tableStyleId>
+              </a:tblPr>
+              <a:tblGrid>
+                <a:gridCol w="2340838"/>
+                <a:gridCol w="1322586"/>
+                <a:gridCol w="1322586"/>
+                <a:gridCol w="1322586"/>
+                <a:gridCol w="1322586"/>
+                <a:gridCol w="1322586"/>
+              </a:tblGrid>
+              <a:tr h="370840">
+                <a:tc>
+                  <a:txBody>
+                    <a:bodyPr/>
+                    <a:lstStyle/>
+                    <a:p>
+                      <a:r>
+                        <a:rPr lang="en-US" dirty="0" smtClean="0"/>
+                        <a:t>N/No.</a:t>
+                      </a:r>
+                      <a:r>
+                        <a:rPr lang="en-US" baseline="0" dirty="0" smtClean="0"/>
+                        <a:t> of threads</a:t>
+                      </a:r>
+                      <a:endParaRPr lang="en-US" dirty="0"/>
+                    </a:p>
+                  </a:txBody>
+                  <a:tcPr/>
+                </a:tc>
+                <a:tc>
+                  <a:txBody>
+                    <a:bodyPr/>
+                    <a:lstStyle/>
+                    <a:p>
+                      <a:pPr algn="ctr"/>
+                      <a:r>
+                        <a:rPr lang="en-US" dirty="0" smtClean="0"/>
+                        <a:t>n/16</a:t>
+                      </a:r>
+                      <a:endParaRPr lang="en-US" dirty="0"/>
+                    </a:p>
+                  </a:txBody>
+                  <a:tcPr/>
+                </a:tc>
+                <a:tc>
+                  <a:txBody>
+                    <a:bodyPr/>
+                    <a:lstStyle/>
+                    <a:p>
+                      <a:pPr algn="ctr"/>
+                      <a:r>
+                        <a:rPr lang="en-US" dirty="0" smtClean="0"/>
+                        <a:t>2n/32</a:t>
+                      </a:r>
+                      <a:endParaRPr lang="en-US" dirty="0"/>
+                    </a:p>
+                  </a:txBody>
+                  <a:tcPr/>
+                </a:tc>
+                <a:tc>
+                  <a:txBody>
+                    <a:bodyPr/>
+                    <a:lstStyle/>
+                    <a:p>
+                      <a:pPr algn="ctr"/>
+                      <a:r>
+                        <a:rPr lang="en-US" dirty="0" smtClean="0"/>
+                        <a:t>4n/64</a:t>
+                      </a:r>
+                      <a:endParaRPr lang="en-US" dirty="0"/>
+                    </a:p>
+                  </a:txBody>
+                  <a:tcPr/>
+                </a:tc>
+                <a:tc>
+                  <a:txBody>
+                    <a:bodyPr/>
+                    <a:lstStyle/>
+                    <a:p>
+                      <a:pPr algn="ctr"/>
+                      <a:r>
+                        <a:rPr lang="en-US" dirty="0" smtClean="0"/>
+                        <a:t>8n/128</a:t>
+                      </a:r>
+                      <a:endParaRPr lang="en-US" dirty="0"/>
+                    </a:p>
+                  </a:txBody>
+                  <a:tcPr/>
+                </a:tc>
+                <a:tc>
+                  <a:txBody>
+                    <a:bodyPr/>
+                    <a:lstStyle/>
+                    <a:p>
+                      <a:pPr algn="ctr"/>
+                      <a:r>
+                        <a:rPr lang="en-US" dirty="0" smtClean="0"/>
+                        <a:t>16n/256</a:t>
+                      </a:r>
+                      <a:endParaRPr lang="en-US" dirty="0"/>
+                    </a:p>
+                  </a:txBody>
+                  <a:tcPr/>
+                </a:tc>
+              </a:tr>
+              <a:tr h="370840">
+                <a:tc>
+                  <a:txBody>
+                    <a:bodyPr/>
+                    <a:lstStyle/>
+                    <a:p>
+                      <a:r>
+                        <a:rPr lang="en-US" dirty="0" smtClean="0"/>
+                        <a:t>Execution time (</a:t>
+                      </a:r>
+                      <a:r>
+                        <a:rPr lang="en-US" dirty="0" err="1" smtClean="0"/>
+                        <a:t>ms</a:t>
+                      </a:r>
+                      <a:r>
+                        <a:rPr lang="en-US" dirty="0" smtClean="0"/>
+                        <a:t>)</a:t>
+                      </a:r>
+                      <a:endParaRPr lang="en-US" dirty="0"/>
+                    </a:p>
+                  </a:txBody>
+                  <a:tcPr/>
+                </a:tc>
+                <a:tc>
+                  <a:txBody>
+                    <a:bodyPr/>
+                    <a:lstStyle/>
+                    <a:p>
+                      <a:pPr algn="ctr"/>
+                      <a:r>
+                        <a:rPr lang="en-US" sz="1800" kern="1200" dirty="0" smtClean="0">
+                          <a:solidFill>
+                            <a:schemeClr val="dk1"/>
+                          </a:solidFill>
+                          <a:latin typeface="+mn-lt"/>
+                          <a:ea typeface="+mn-ea"/>
+                          <a:cs typeface="+mn-cs"/>
+                        </a:rPr>
+                        <a:t>31</a:t>
+                      </a:r>
+                      <a:endParaRPr lang="en-US" dirty="0"/>
+                    </a:p>
+                  </a:txBody>
+                  <a:tcPr/>
+                </a:tc>
+                <a:tc>
+                  <a:txBody>
+                    <a:bodyPr/>
+                    <a:lstStyle/>
+                    <a:p>
+                      <a:pPr algn="ctr"/>
+                      <a:r>
+                        <a:rPr lang="en-US" sz="1800" kern="1200" dirty="0" smtClean="0">
+                          <a:solidFill>
+                            <a:schemeClr val="dk1"/>
+                          </a:solidFill>
+                          <a:latin typeface="+mn-lt"/>
+                          <a:ea typeface="+mn-ea"/>
+                          <a:cs typeface="+mn-cs"/>
+                        </a:rPr>
+                        <a:t>37</a:t>
+                      </a:r>
+                      <a:endParaRPr lang="en-US" dirty="0"/>
+                    </a:p>
+                  </a:txBody>
+                  <a:tcPr/>
+                </a:tc>
+                <a:tc>
+                  <a:txBody>
+                    <a:bodyPr/>
+                    <a:lstStyle/>
+                    <a:p>
+                      <a:pPr algn="ctr"/>
+                      <a:r>
+                        <a:rPr lang="en-US" sz="1800" kern="1200" dirty="0" smtClean="0">
+                          <a:solidFill>
+                            <a:schemeClr val="dk1"/>
+                          </a:solidFill>
+                          <a:latin typeface="+mn-lt"/>
+                          <a:ea typeface="+mn-ea"/>
+                          <a:cs typeface="+mn-cs"/>
+                        </a:rPr>
+                        <a:t>50</a:t>
+                      </a:r>
+                      <a:endParaRPr lang="en-US" dirty="0"/>
+                    </a:p>
+                  </a:txBody>
+                  <a:tcPr/>
+                </a:tc>
+                <a:tc>
+                  <a:txBody>
+                    <a:bodyPr/>
+                    <a:lstStyle/>
+                    <a:p>
+                      <a:pPr algn="ctr"/>
+                      <a:r>
+                        <a:rPr lang="en-US" sz="1800" kern="1200" dirty="0" smtClean="0">
+                          <a:solidFill>
+                            <a:schemeClr val="dk1"/>
+                          </a:solidFill>
+                          <a:latin typeface="+mn-lt"/>
+                          <a:ea typeface="+mn-ea"/>
+                          <a:cs typeface="+mn-cs"/>
+                        </a:rPr>
+                        <a:t>73</a:t>
+                      </a:r>
+                      <a:endParaRPr lang="en-US" dirty="0"/>
+                    </a:p>
+                  </a:txBody>
+                  <a:tcPr/>
+                </a:tc>
+                <a:tc>
+                  <a:txBody>
+                    <a:bodyPr/>
+                    <a:lstStyle/>
+                    <a:p>
+                      <a:pPr marL="0" marR="0" lvl="0" indent="0" algn="ctr" defTabSz="914400" rtl="0" eaLnBrk="1" fontAlgn="auto" latinLnBrk="0" hangingPunct="1">
+                        <a:lnSpc>
+                          <a:spcPct val="100000"/>
+                        </a:lnSpc>
+                        <a:spcBef>
+                          <a:spcPts val="0"/>
+                        </a:spcBef>
+                        <a:spcAft>
+                          <a:spcPts val="0"/>
+                        </a:spcAft>
+                        <a:buClrTx/>
+                        <a:buSzTx/>
+                        <a:buFontTx/>
+                        <a:buNone/>
+                        <a:tabLst/>
+                        <a:defRPr/>
+                      </a:pPr>
+                      <a:r>
+                        <a:rPr lang="en-US" sz="1800" kern="1200" dirty="0" smtClean="0">
+                          <a:solidFill>
+                            <a:schemeClr val="dk1"/>
+                          </a:solidFill>
+                          <a:latin typeface="+mn-lt"/>
+                          <a:ea typeface="+mn-ea"/>
+                          <a:cs typeface="+mn-cs"/>
+                        </a:rPr>
+                        <a:t>209</a:t>
+                      </a:r>
+                    </a:p>
+                  </a:txBody>
+                  <a:tcPr/>
+                </a:tc>
+              </a:tr>
+            </a:tbl>
+          </a:graphicData>
+        </a:graphic>
+      </p:graphicFrame>
+      <p:graphicFrame>
+        <p:nvGraphicFramePr>
+          <p:cNvPr id="6" name="Table 5"/>
+          <p:cNvGraphicFramePr>
+            <a:graphicFrameLocks noGrp="1"/>
+          </p:cNvGraphicFramePr>
+          <p:nvPr>
+            <p:extLst>
+              <p:ext uri="{D42A27DB-BD31-4B8C-83A1-F6EECF244321}">
+                <p14:modId xmlns:p14="http://schemas.microsoft.com/office/powerpoint/2010/main" val="2115578463"/>
+              </p:ext>
+            </p:extLst>
+          </p:nvPr>
+        </p:nvGraphicFramePr>
+        <p:xfrm>
+          <a:off x="1616955" y="4883105"/>
+          <a:ext cx="8953768" cy="741680"/>
+        </p:xfrm>
+        <a:graphic>
+          <a:graphicData uri="http://schemas.openxmlformats.org/drawingml/2006/table">
+            <a:tbl>
+              <a:tblPr firstRow="1" bandRow="1">
+                <a:tableStyleId>{5C22544A-7EE6-4342-B048-85BDC9FD1C3A}</a:tableStyleId>
+              </a:tblPr>
+              <a:tblGrid>
+                <a:gridCol w="2340838"/>
+                <a:gridCol w="1322586"/>
+                <a:gridCol w="1322586"/>
+                <a:gridCol w="1322586"/>
+                <a:gridCol w="1322586"/>
+                <a:gridCol w="1322586"/>
+              </a:tblGrid>
+              <a:tr h="370840">
+                <a:tc>
+                  <a:txBody>
+                    <a:bodyPr/>
+                    <a:lstStyle/>
+                    <a:p>
+                      <a:r>
+                        <a:rPr lang="en-US" dirty="0" smtClean="0"/>
+                        <a:t>No.</a:t>
+                      </a:r>
+                      <a:r>
+                        <a:rPr lang="en-US" baseline="0" dirty="0" smtClean="0"/>
+                        <a:t> of threads</a:t>
+                      </a:r>
+                      <a:endParaRPr lang="en-US" dirty="0"/>
+                    </a:p>
+                  </a:txBody>
+                  <a:tcPr/>
+                </a:tc>
+                <a:tc>
+                  <a:txBody>
+                    <a:bodyPr/>
+                    <a:lstStyle/>
+                    <a:p>
+                      <a:pPr algn="ctr"/>
+                      <a:r>
+                        <a:rPr lang="en-US" dirty="0" smtClean="0"/>
+                        <a:t>16</a:t>
+                      </a:r>
+                      <a:endParaRPr lang="en-US" dirty="0"/>
+                    </a:p>
+                  </a:txBody>
+                  <a:tcPr/>
+                </a:tc>
+                <a:tc>
+                  <a:txBody>
+                    <a:bodyPr/>
+                    <a:lstStyle/>
+                    <a:p>
+                      <a:pPr algn="ctr"/>
+                      <a:r>
+                        <a:rPr lang="en-US" dirty="0" smtClean="0"/>
+                        <a:t>32</a:t>
+                      </a:r>
+                      <a:endParaRPr lang="en-US" dirty="0"/>
+                    </a:p>
+                  </a:txBody>
+                  <a:tcPr/>
+                </a:tc>
+                <a:tc>
+                  <a:txBody>
+                    <a:bodyPr/>
+                    <a:lstStyle/>
+                    <a:p>
+                      <a:pPr algn="ctr"/>
+                      <a:r>
+                        <a:rPr lang="en-US" dirty="0" smtClean="0"/>
+                        <a:t>64</a:t>
+                      </a:r>
+                      <a:endParaRPr lang="en-US" dirty="0"/>
+                    </a:p>
+                  </a:txBody>
+                  <a:tcPr/>
+                </a:tc>
+                <a:tc>
+                  <a:txBody>
+                    <a:bodyPr/>
+                    <a:lstStyle/>
+                    <a:p>
+                      <a:pPr algn="ctr"/>
+                      <a:r>
+                        <a:rPr lang="en-US" dirty="0" smtClean="0"/>
+                        <a:t>128</a:t>
+                      </a:r>
+                      <a:endParaRPr lang="en-US" dirty="0"/>
+                    </a:p>
+                  </a:txBody>
+                  <a:tcPr/>
+                </a:tc>
+                <a:tc>
+                  <a:txBody>
+                    <a:bodyPr/>
+                    <a:lstStyle/>
+                    <a:p>
+                      <a:pPr algn="ctr"/>
+                      <a:r>
+                        <a:rPr lang="en-US" dirty="0" smtClean="0"/>
+                        <a:t>256</a:t>
+                      </a:r>
+                      <a:endParaRPr lang="en-US" dirty="0"/>
+                    </a:p>
+                  </a:txBody>
+                  <a:tcPr/>
+                </a:tc>
+              </a:tr>
+              <a:tr h="370840">
+                <a:tc>
+                  <a:txBody>
+                    <a:bodyPr/>
+                    <a:lstStyle/>
+                    <a:p>
+                      <a:r>
+                        <a:rPr lang="en-US" dirty="0" smtClean="0"/>
+                        <a:t>Execution time (</a:t>
+                      </a:r>
+                      <a:r>
+                        <a:rPr lang="en-US" dirty="0" err="1" smtClean="0"/>
+                        <a:t>ms</a:t>
+                      </a:r>
+                      <a:r>
+                        <a:rPr lang="en-US" dirty="0" smtClean="0"/>
+                        <a:t>)</a:t>
+                      </a:r>
+                      <a:endParaRPr lang="en-US" dirty="0"/>
+                    </a:p>
+                  </a:txBody>
+                  <a:tcPr/>
+                </a:tc>
+                <a:tc>
+                  <a:txBody>
+                    <a:bodyPr/>
+                    <a:lstStyle/>
+                    <a:p>
+                      <a:pPr algn="ctr"/>
+                      <a:r>
+                        <a:rPr lang="en-US" sz="1800" kern="1200" dirty="0" smtClean="0">
+                          <a:solidFill>
+                            <a:schemeClr val="dk1"/>
+                          </a:solidFill>
+                          <a:latin typeface="+mn-lt"/>
+                          <a:ea typeface="+mn-ea"/>
+                          <a:cs typeface="+mn-cs"/>
+                        </a:rPr>
+                        <a:t>35</a:t>
+                      </a:r>
+                      <a:endParaRPr lang="en-US" dirty="0"/>
+                    </a:p>
+                  </a:txBody>
+                  <a:tcPr/>
+                </a:tc>
+                <a:tc>
+                  <a:txBody>
+                    <a:bodyPr/>
+                    <a:lstStyle/>
+                    <a:p>
+                      <a:pPr marL="0" marR="0" lvl="0" indent="0" algn="ctr" defTabSz="914400" rtl="0" eaLnBrk="1" fontAlgn="auto" latinLnBrk="0" hangingPunct="1">
+                        <a:lnSpc>
+                          <a:spcPct val="100000"/>
+                        </a:lnSpc>
+                        <a:spcBef>
+                          <a:spcPts val="0"/>
+                        </a:spcBef>
+                        <a:spcAft>
+                          <a:spcPts val="0"/>
+                        </a:spcAft>
+                        <a:buClrTx/>
+                        <a:buSzTx/>
+                        <a:buFontTx/>
+                        <a:buNone/>
+                        <a:tabLst/>
+                        <a:defRPr/>
+                      </a:pPr>
+                      <a:r>
+                        <a:rPr lang="en-US" sz="1800" kern="1200" dirty="0" smtClean="0">
+                          <a:solidFill>
+                            <a:schemeClr val="dk1"/>
+                          </a:solidFill>
+                          <a:latin typeface="+mn-lt"/>
+                          <a:ea typeface="+mn-ea"/>
+                          <a:cs typeface="+mn-cs"/>
+                        </a:rPr>
+                        <a:t>36</a:t>
+                      </a:r>
+                      <a:endParaRPr lang="en-US" sz="1800" kern="1200" dirty="0" smtClean="0">
+                        <a:solidFill>
+                          <a:schemeClr val="dk1"/>
+                        </a:solidFill>
+                        <a:latin typeface="+mn-lt"/>
+                        <a:ea typeface="+mn-ea"/>
+                        <a:cs typeface="+mn-cs"/>
+                      </a:endParaRPr>
+                    </a:p>
+                  </a:txBody>
+                  <a:tcPr/>
+                </a:tc>
+                <a:tc>
+                  <a:txBody>
+                    <a:bodyPr/>
+                    <a:lstStyle/>
+                    <a:p>
+                      <a:pPr algn="ctr"/>
+                      <a:r>
+                        <a:rPr lang="en-US" sz="1800" kern="1200" dirty="0" smtClean="0">
+                          <a:solidFill>
+                            <a:schemeClr val="dk1"/>
+                          </a:solidFill>
+                          <a:latin typeface="+mn-lt"/>
+                          <a:ea typeface="+mn-ea"/>
+                          <a:cs typeface="+mn-cs"/>
+                        </a:rPr>
+                        <a:t>47</a:t>
+                      </a:r>
+                      <a:endParaRPr lang="en-US" dirty="0"/>
+                    </a:p>
+                  </a:txBody>
+                  <a:tcPr/>
+                </a:tc>
+                <a:tc>
+                  <a:txBody>
+                    <a:bodyPr/>
+                    <a:lstStyle/>
+                    <a:p>
+                      <a:pPr algn="ctr"/>
+                      <a:r>
+                        <a:rPr lang="en-US" sz="1800" kern="1200" dirty="0" smtClean="0">
+                          <a:solidFill>
+                            <a:schemeClr val="dk1"/>
+                          </a:solidFill>
+                          <a:latin typeface="+mn-lt"/>
+                          <a:ea typeface="+mn-ea"/>
+                          <a:cs typeface="+mn-cs"/>
+                        </a:rPr>
+                        <a:t>69</a:t>
+                      </a:r>
+                      <a:endParaRPr lang="en-US" dirty="0"/>
+                    </a:p>
+                  </a:txBody>
+                  <a:tcPr/>
+                </a:tc>
+                <a:tc>
+                  <a:txBody>
+                    <a:bodyPr/>
+                    <a:lstStyle/>
+                    <a:p>
+                      <a:pPr algn="ctr"/>
+                      <a:r>
+                        <a:rPr lang="en-US" sz="1800" kern="1200" dirty="0" smtClean="0">
+                          <a:solidFill>
+                            <a:schemeClr val="dk1"/>
+                          </a:solidFill>
+                          <a:latin typeface="+mn-lt"/>
+                          <a:ea typeface="+mn-ea"/>
+                          <a:cs typeface="+mn-cs"/>
+                        </a:rPr>
+                        <a:t>113</a:t>
+                      </a:r>
+                      <a:endParaRPr lang="en-US" dirty="0"/>
+                    </a:p>
+                  </a:txBody>
+                  <a:tcPr/>
+                </a:tc>
+              </a:tr>
+            </a:tbl>
+          </a:graphicData>
+        </a:graphic>
+      </p:graphicFrame>
     </p:spTree>
     <p:extLst>
       <p:ext uri="{BB962C8B-B14F-4D97-AF65-F5344CB8AC3E}">
-        <p14:creationId xmlns:p14="http://schemas.microsoft.com/office/powerpoint/2010/main" val="820832581"/>
+        <p14:creationId xmlns:p14="http://schemas.microsoft.com/office/powerpoint/2010/main" val="351755432"/>
       </p:ext>
     </p:extLst>
   </p:cSld>
   <p:clrMapOvr>
     <a:masterClrMapping/>
   </p:clrMapOvr>
+  <p:timing>
+    <p:tnLst>
+      <p:par>
+        <p:cTn id="1" dur="indefinite" restart="never" nodeType="tmRoot"/>
+      </p:par>
+    </p:tnLst>
+  </p:timing>
 </p:sld>
 </file>
 
@@ -3920,7 +5140,7 @@
           <a:bodyPr/>
           <a:lstStyle/>
           <a:p>
-            <a:endParaRPr lang="en-US"/>
+            <a:endParaRPr lang="en-US" dirty="0"/>
           </a:p>
         </p:txBody>
       </p:sp>
@@ -3934,6 +5154,13 @@
   <p:clrMapOvr>
     <a:masterClrMapping/>
   </p:clrMapOvr>
+  <p:timing>
+    <p:tnLst>
+      <p:par>
+        <p:cTn id="1" dur="indefinite" restart="never" nodeType="tmRoot"/>
+      </p:par>
+    </p:tnLst>
+  </p:timing>
 </p:sld>
 </file>
 
@@ -4054,6 +5281,13 @@
   <p:clrMapOvr>
     <a:masterClrMapping/>
   </p:clrMapOvr>
+  <p:timing>
+    <p:tnLst>
+      <p:par>
+        <p:cTn id="1" dur="indefinite" restart="never" nodeType="tmRoot"/>
+      </p:par>
+    </p:tnLst>
+  </p:timing>
 </p:sld>
 </file>
 
@@ -4134,6 +5368,13 @@
   <p:clrMapOvr>
     <a:masterClrMapping/>
   </p:clrMapOvr>
+  <p:timing>
+    <p:tnLst>
+      <p:par>
+        <p:cTn id="1" dur="indefinite" restart="never" nodeType="tmRoot"/>
+      </p:par>
+    </p:tnLst>
+  </p:timing>
 </p:sld>
 </file>
 
@@ -4177,8 +5418,8 @@
           </a:p>
         </p:txBody>
       </p:sp>
-      <mc:AlternateContent xmlns:mc="http://schemas.openxmlformats.org/markup-compatibility/2006">
-        <mc:Choice xmlns:a14="http://schemas.microsoft.com/office/drawing/2010/main" Requires="a14">
+      <mc:AlternateContent xmlns:mc="http://schemas.openxmlformats.org/markup-compatibility/2006" xmlns:a14="http://schemas.microsoft.com/office/drawing/2010/main">
+        <mc:Choice Requires="a14">
           <p:sp>
             <p:nvSpPr>
               <p:cNvPr id="3" name="Content Placeholder 2"/>
@@ -4199,7 +5440,23 @@
                 </a:pPr>
                 <a:r>
                   <a:rPr lang="en-US" dirty="0" smtClean="0"/>
-                  <a:t>By means of integrating the function</a:t>
+                  <a:t>The </a:t>
+                </a:r>
+                <a:r>
+                  <a:rPr lang="en-US" dirty="0"/>
+                  <a:t>value of </a:t>
+                </a:r>
+                <a:r>
+                  <a:rPr lang="el-GR" dirty="0"/>
+                  <a:t>π</a:t>
+                </a:r>
+                <a:r>
+                  <a:rPr lang="en-US" dirty="0"/>
+                  <a:t> can be </a:t>
+                </a:r>
+                <a:r>
+                  <a:rPr lang="en-US" dirty="0" smtClean="0"/>
+                  <a:t>approximated, by means of integrating the function</a:t>
                 </a:r>
               </a:p>
               <a:p>
@@ -4207,98 +5464,104 @@
                   <a:buNone/>
                 </a:pPr>
                 <a14:m>
-                  <m:oMath xmlns:m="http://schemas.openxmlformats.org/officeDocument/2006/math">
-                    <m:r>
-                      <a:rPr lang="en-US" i="1" smtClean="0">
-                        <a:latin typeface="Cambria Math" panose="02040503050406030204" pitchFamily="18" charset="0"/>
-                        <a:ea typeface="Cambria Math" panose="02040503050406030204" pitchFamily="18" charset="0"/>
-                      </a:rPr>
-                      <m:t>𝜑</m:t>
-                    </m:r>
-                    <m:d>
-                      <m:dPr>
-                        <m:ctrlPr>
-                          <a:rPr lang="en-US" b="0" i="1" smtClean="0">
-                            <a:latin typeface="Cambria Math" panose="02040503050406030204" pitchFamily="18" charset="0"/>
-                            <a:ea typeface="Cambria Math" panose="02040503050406030204" pitchFamily="18" charset="0"/>
-                          </a:rPr>
-                        </m:ctrlPr>
-                      </m:dPr>
-                      <m:e>
-                        <m:r>
-                          <a:rPr lang="en-US" b="0" i="1" smtClean="0">
-                            <a:latin typeface="Cambria Math" panose="02040503050406030204" pitchFamily="18" charset="0"/>
-                            <a:ea typeface="Cambria Math" panose="02040503050406030204" pitchFamily="18" charset="0"/>
-                          </a:rPr>
-                          <m:t>𝑥</m:t>
-                        </m:r>
-                      </m:e>
-                    </m:d>
-                    <m:r>
-                      <a:rPr lang="en-US" b="0" i="1" smtClean="0">
-                        <a:latin typeface="Cambria Math" panose="02040503050406030204" pitchFamily="18" charset="0"/>
-                        <a:ea typeface="Cambria Math" panose="02040503050406030204" pitchFamily="18" charset="0"/>
-                      </a:rPr>
-                      <m:t>=</m:t>
-                    </m:r>
-                    <m:f>
-                      <m:fPr>
-                        <m:ctrlPr>
-                          <a:rPr lang="en-US" b="0" i="1" smtClean="0">
-                            <a:latin typeface="Cambria Math" panose="02040503050406030204" pitchFamily="18" charset="0"/>
-                            <a:ea typeface="Cambria Math" panose="02040503050406030204" pitchFamily="18" charset="0"/>
-                          </a:rPr>
-                        </m:ctrlPr>
-                      </m:fPr>
-                      <m:num>
-                        <m:r>
-                          <a:rPr lang="en-US" b="0" i="1" smtClean="0">
-                            <a:latin typeface="Cambria Math" panose="02040503050406030204" pitchFamily="18" charset="0"/>
-                            <a:ea typeface="Cambria Math" panose="02040503050406030204" pitchFamily="18" charset="0"/>
-                          </a:rPr>
-                          <m:t>1</m:t>
-                        </m:r>
-                      </m:num>
-                      <m:den>
-                        <m:r>
-                          <a:rPr lang="en-US" b="0" i="1" smtClean="0">
-                            <a:latin typeface="Cambria Math" panose="02040503050406030204" pitchFamily="18" charset="0"/>
-                            <a:ea typeface="Cambria Math" panose="02040503050406030204" pitchFamily="18" charset="0"/>
-                          </a:rPr>
-                          <m:t>1+</m:t>
-                        </m:r>
-                        <m:sSup>
-                          <m:sSupPr>
-                            <m:ctrlPr>
-                              <a:rPr lang="en-US" b="0" i="1" smtClean="0">
-                                <a:latin typeface="Cambria Math" panose="02040503050406030204" pitchFamily="18" charset="0"/>
-                                <a:ea typeface="Cambria Math" panose="02040503050406030204" pitchFamily="18" charset="0"/>
-                              </a:rPr>
-                            </m:ctrlPr>
-                          </m:sSupPr>
-                          <m:e>
-                            <m:r>
-                              <a:rPr lang="en-US" b="0" i="1" smtClean="0">
-                                <a:latin typeface="Cambria Math" panose="02040503050406030204" pitchFamily="18" charset="0"/>
-                                <a:ea typeface="Cambria Math" panose="02040503050406030204" pitchFamily="18" charset="0"/>
-                              </a:rPr>
-                              <m:t>𝑥</m:t>
-                            </m:r>
-                          </m:e>
-                          <m:sup>
-                            <m:r>
-                              <a:rPr lang="en-US" b="0" i="1" smtClean="0">
-                                <a:latin typeface="Cambria Math" panose="02040503050406030204" pitchFamily="18" charset="0"/>
-                                <a:ea typeface="Cambria Math" panose="02040503050406030204" pitchFamily="18" charset="0"/>
-                              </a:rPr>
-                              <m:t>2</m:t>
-                            </m:r>
-                          </m:sup>
-                        </m:sSup>
-                      </m:den>
-                    </m:f>
-                  </m:oMath>
+                  <m:oMathPara xmlns:m="http://schemas.openxmlformats.org/officeDocument/2006/math">
+                    <m:oMathParaPr>
+                      <m:jc m:val="centerGroup"/>
+                    </m:oMathParaPr>
+                    <m:oMath xmlns:m="http://schemas.openxmlformats.org/officeDocument/2006/math">
+                      <m:r>
+                        <a:rPr lang="en-US" i="1" smtClean="0">
+                          <a:latin typeface="Cambria Math" panose="02040503050406030204" pitchFamily="18" charset="0"/>
+                          <a:ea typeface="Cambria Math" panose="02040503050406030204" pitchFamily="18" charset="0"/>
+                        </a:rPr>
+                        <m:t>𝜑</m:t>
+                      </m:r>
+                      <m:d>
+                        <m:dPr>
+                          <m:ctrlPr>
+                            <a:rPr lang="en-US" b="0" i="1" smtClean="0">
+                              <a:latin typeface="Cambria Math" panose="02040503050406030204" pitchFamily="18" charset="0"/>
+                              <a:ea typeface="Cambria Math" panose="02040503050406030204" pitchFamily="18" charset="0"/>
+                            </a:rPr>
+                          </m:ctrlPr>
+                        </m:dPr>
+                        <m:e>
+                          <m:r>
+                            <a:rPr lang="en-US" b="0" i="1" smtClean="0">
+                              <a:latin typeface="Cambria Math" panose="02040503050406030204" pitchFamily="18" charset="0"/>
+                              <a:ea typeface="Cambria Math" panose="02040503050406030204" pitchFamily="18" charset="0"/>
+                            </a:rPr>
+                            <m:t>𝑥</m:t>
+                          </m:r>
+                        </m:e>
+                      </m:d>
+                      <m:r>
+                        <a:rPr lang="en-US" b="0" i="1" smtClean="0">
+                          <a:latin typeface="Cambria Math" panose="02040503050406030204" pitchFamily="18" charset="0"/>
+                          <a:ea typeface="Cambria Math" panose="02040503050406030204" pitchFamily="18" charset="0"/>
+                        </a:rPr>
+                        <m:t>=</m:t>
+                      </m:r>
+                      <m:f>
+                        <m:fPr>
+                          <m:ctrlPr>
+                            <a:rPr lang="en-US" b="0" i="1" smtClean="0">
+                              <a:latin typeface="Cambria Math" panose="02040503050406030204" pitchFamily="18" charset="0"/>
+                              <a:ea typeface="Cambria Math" panose="02040503050406030204" pitchFamily="18" charset="0"/>
+                            </a:rPr>
+                          </m:ctrlPr>
+                        </m:fPr>
+                        <m:num>
+                          <m:r>
+                            <a:rPr lang="en-US" b="0" i="1" smtClean="0">
+                              <a:latin typeface="Cambria Math" panose="02040503050406030204" pitchFamily="18" charset="0"/>
+                              <a:ea typeface="Cambria Math" panose="02040503050406030204" pitchFamily="18" charset="0"/>
+                            </a:rPr>
+                            <m:t>1</m:t>
+                          </m:r>
+                        </m:num>
+                        <m:den>
+                          <m:r>
+                            <a:rPr lang="en-US" b="0" i="1" smtClean="0">
+                              <a:latin typeface="Cambria Math" panose="02040503050406030204" pitchFamily="18" charset="0"/>
+                              <a:ea typeface="Cambria Math" panose="02040503050406030204" pitchFamily="18" charset="0"/>
+                            </a:rPr>
+                            <m:t>1+</m:t>
+                          </m:r>
+                          <m:sSup>
+                            <m:sSupPr>
+                              <m:ctrlPr>
+                                <a:rPr lang="en-US" b="0" i="1" smtClean="0">
+                                  <a:latin typeface="Cambria Math" panose="02040503050406030204" pitchFamily="18" charset="0"/>
+                                  <a:ea typeface="Cambria Math" panose="02040503050406030204" pitchFamily="18" charset="0"/>
+                                </a:rPr>
+                              </m:ctrlPr>
+                            </m:sSupPr>
+                            <m:e>
+                              <m:r>
+                                <a:rPr lang="en-US" b="0" i="1" smtClean="0">
+                                  <a:latin typeface="Cambria Math" panose="02040503050406030204" pitchFamily="18" charset="0"/>
+                                  <a:ea typeface="Cambria Math" panose="02040503050406030204" pitchFamily="18" charset="0"/>
+                                </a:rPr>
+                                <m:t>𝑥</m:t>
+                              </m:r>
+                            </m:e>
+                            <m:sup>
+                              <m:r>
+                                <a:rPr lang="en-US" b="0" i="1" smtClean="0">
+                                  <a:latin typeface="Cambria Math" panose="02040503050406030204" pitchFamily="18" charset="0"/>
+                                  <a:ea typeface="Cambria Math" panose="02040503050406030204" pitchFamily="18" charset="0"/>
+                                </a:rPr>
+                                <m:t>2</m:t>
+                              </m:r>
+                            </m:sup>
+                          </m:sSup>
+                        </m:den>
+                      </m:f>
+                    </m:oMath>
+                  </m:oMathPara>
                 </a14:m>
+                <a:endParaRPr lang="en-US" dirty="0" smtClean="0"/>
               </a:p>
               <a:p>
                 <a:pPr marL="0" indent="0">
@@ -4312,15 +5575,7 @@
                 </a:r>
                 <a:r>
                   <a:rPr lang="en-US" dirty="0" smtClean="0"/>
-                  <a:t>ver the interval [0, 1], the value of </a:t>
-                </a:r>
-                <a:r>
-                  <a:rPr lang="el-GR" dirty="0" smtClean="0"/>
-                  <a:t>π</a:t>
-                </a:r>
-                <a:r>
-                  <a:rPr lang="en-US" dirty="0" smtClean="0"/>
-                  <a:t> can be approximated.</a:t>
+                  <a:t>ver the interval [0, 1].</a:t>
                 </a:r>
               </a:p>
               <a:p>
@@ -4347,7 +5602,7 @@
             </p:txBody>
           </p:sp>
         </mc:Choice>
-        <mc:Fallback>
+        <mc:Fallback xmlns="">
           <p:sp>
             <p:nvSpPr>
               <p:cNvPr id="3" name="Content Placeholder 2"/>
@@ -4391,6 +5646,13 @@
   <p:clrMapOvr>
     <a:masterClrMapping/>
   </p:clrMapOvr>
+  <p:timing>
+    <p:tnLst>
+      <p:par>
+        <p:cTn id="1" dur="indefinite" restart="never" nodeType="tmRoot"/>
+      </p:par>
+    </p:tnLst>
+  </p:timing>
 </p:sld>
 </file>
 
@@ -4557,6 +5819,13 @@
   <p:clrMapOvr>
     <a:masterClrMapping/>
   </p:clrMapOvr>
+  <p:timing>
+    <p:tnLst>
+      <p:par>
+        <p:cTn id="1" dur="indefinite" restart="never" nodeType="tmRoot"/>
+      </p:par>
+    </p:tnLst>
+  </p:timing>
 </p:sld>
 </file>
 
@@ -4600,8 +5869,8 @@
           </a:p>
         </p:txBody>
       </p:sp>
-      <mc:AlternateContent xmlns:mc="http://schemas.openxmlformats.org/markup-compatibility/2006">
-        <mc:Choice xmlns:a14="http://schemas.microsoft.com/office/drawing/2010/main" Requires="a14">
+      <mc:AlternateContent xmlns:mc="http://schemas.openxmlformats.org/markup-compatibility/2006" xmlns:a14="http://schemas.microsoft.com/office/drawing/2010/main">
+        <mc:Choice Requires="a14">
           <p:sp>
             <p:nvSpPr>
               <p:cNvPr id="3" name="Content Placeholder 2"/>
@@ -5089,12 +6358,16 @@
                   <a:rPr lang="el-GR" dirty="0" smtClean="0"/>
                   <a:t>π</a:t>
                 </a:r>
+                <a:r>
+                  <a:rPr lang="en-US" smtClean="0"/>
+                  <a:t>.</a:t>
+                </a:r>
                 <a:endParaRPr lang="en-US" dirty="0"/>
               </a:p>
             </p:txBody>
           </p:sp>
         </mc:Choice>
-        <mc:Fallback>
+        <mc:Fallback xmlns="">
           <p:sp>
             <p:nvSpPr>
               <p:cNvPr id="3" name="Content Placeholder 2"/>
@@ -5138,6 +6411,13 @@
   <p:clrMapOvr>
     <a:masterClrMapping/>
   </p:clrMapOvr>
+  <p:timing>
+    <p:tnLst>
+      <p:par>
+        <p:cTn id="1" dur="indefinite" restart="never" nodeType="tmRoot"/>
+      </p:par>
+    </p:tnLst>
+  </p:timing>
 </p:sld>
 </file>
 
@@ -5207,8 +6487,8 @@
           </a:prstGeom>
         </p:spPr>
       </p:pic>
-      <mc:AlternateContent xmlns:mc="http://schemas.openxmlformats.org/markup-compatibility/2006">
-        <mc:Choice xmlns:a14="http://schemas.microsoft.com/office/drawing/2010/main" Requires="a14">
+      <mc:AlternateContent xmlns:mc="http://schemas.openxmlformats.org/markup-compatibility/2006" xmlns:a14="http://schemas.microsoft.com/office/drawing/2010/main">
+        <mc:Choice Requires="a14">
           <p:sp>
             <p:nvSpPr>
               <p:cNvPr id="5" name="Rectangle 4"/>
@@ -5230,6 +6510,7 @@
               </a:bodyPr>
               <a:lstStyle/>
               <a:p>
+                <a:pPr/>
                 <a14:m>
                   <m:oMathPara xmlns:m="http://schemas.openxmlformats.org/officeDocument/2006/math">
                     <m:oMathParaPr>
@@ -5300,7 +6581,7 @@
             </p:txBody>
           </p:sp>
         </mc:Choice>
-        <mc:Fallback>
+        <mc:Fallback xmlns="">
           <p:sp>
             <p:nvSpPr>
               <p:cNvPr id="5" name="Rectangle 4"/>
@@ -5339,8 +6620,8 @@
           </p:sp>
         </mc:Fallback>
       </mc:AlternateContent>
-      <mc:AlternateContent xmlns:mc="http://schemas.openxmlformats.org/markup-compatibility/2006">
-        <mc:Choice xmlns:a14="http://schemas.microsoft.com/office/drawing/2010/main" Requires="a14">
+      <mc:AlternateContent xmlns:mc="http://schemas.openxmlformats.org/markup-compatibility/2006" xmlns:a14="http://schemas.microsoft.com/office/drawing/2010/main">
+        <mc:Choice Requires="a14">
           <p:sp>
             <p:nvSpPr>
               <p:cNvPr id="6" name="Rectangle 5"/>
@@ -5362,6 +6643,7 @@
               </a:bodyPr>
               <a:lstStyle/>
               <a:p>
+                <a:pPr/>
                 <a14:m>
                   <m:oMathPara xmlns:m="http://schemas.openxmlformats.org/officeDocument/2006/math">
                     <m:oMathParaPr>
@@ -5419,7 +6701,7 @@
             </p:txBody>
           </p:sp>
         </mc:Choice>
-        <mc:Fallback>
+        <mc:Fallback xmlns="">
           <p:sp>
             <p:nvSpPr>
               <p:cNvPr id="6" name="Rectangle 5"/>
@@ -5468,6 +6750,13 @@
   <p:clrMapOvr>
     <a:masterClrMapping/>
   </p:clrMapOvr>
+  <p:timing>
+    <p:tnLst>
+      <p:par>
+        <p:cTn id="1" dur="indefinite" restart="never" nodeType="tmRoot"/>
+      </p:par>
+    </p:tnLst>
+  </p:timing>
 </p:sld>
 </file>
 
@@ -6439,6 +7728,13 @@
   <p:clrMapOvr>
     <a:masterClrMapping/>
   </p:clrMapOvr>
+  <p:timing>
+    <p:tnLst>
+      <p:par>
+        <p:cTn id="1" dur="indefinite" restart="never" nodeType="tmRoot"/>
+      </p:par>
+    </p:tnLst>
+  </p:timing>
 </p:sld>
 </file>
 
@@ -7222,6 +8518,13 @@
   <p:clrMapOvr>
     <a:masterClrMapping/>
   </p:clrMapOvr>
+  <p:timing>
+    <p:tnLst>
+      <p:par>
+        <p:cTn id="1" dur="indefinite" restart="never" nodeType="tmRoot"/>
+      </p:par>
+    </p:tnLst>
+  </p:timing>
 </p:sld>
 </file>
 

</xml_diff>

<commit_message>
Finished exercise 1 and notes on it
</commit_message>
<xml_diff>
--- a/assig2/assig2-pres.pptx
+++ b/assig2/assig2-pres.pptx
@@ -255,7 +255,7 @@
           <a:p>
             <a:fld id="{FA0A5F52-6D2F-4552-B542-30C4C79E48C2}" type="datetimeFigureOut">
               <a:rPr lang="en-US" smtClean="0"/>
-              <a:t>11/17/2017</a:t>
+              <a:t>11/19/2017</a:t>
             </a:fld>
             <a:endParaRPr lang="en-US"/>
           </a:p>
@@ -425,7 +425,7 @@
           <a:p>
             <a:fld id="{FA0A5F52-6D2F-4552-B542-30C4C79E48C2}" type="datetimeFigureOut">
               <a:rPr lang="en-US" smtClean="0"/>
-              <a:t>11/17/2017</a:t>
+              <a:t>11/19/2017</a:t>
             </a:fld>
             <a:endParaRPr lang="en-US"/>
           </a:p>
@@ -605,7 +605,7 @@
           <a:p>
             <a:fld id="{FA0A5F52-6D2F-4552-B542-30C4C79E48C2}" type="datetimeFigureOut">
               <a:rPr lang="en-US" smtClean="0"/>
-              <a:t>11/17/2017</a:t>
+              <a:t>11/19/2017</a:t>
             </a:fld>
             <a:endParaRPr lang="en-US"/>
           </a:p>
@@ -775,7 +775,7 @@
           <a:p>
             <a:fld id="{FA0A5F52-6D2F-4552-B542-30C4C79E48C2}" type="datetimeFigureOut">
               <a:rPr lang="en-US" smtClean="0"/>
-              <a:t>11/17/2017</a:t>
+              <a:t>11/19/2017</a:t>
             </a:fld>
             <a:endParaRPr lang="en-US"/>
           </a:p>
@@ -1021,7 +1021,7 @@
           <a:p>
             <a:fld id="{FA0A5F52-6D2F-4552-B542-30C4C79E48C2}" type="datetimeFigureOut">
               <a:rPr lang="en-US" smtClean="0"/>
-              <a:t>11/17/2017</a:t>
+              <a:t>11/19/2017</a:t>
             </a:fld>
             <a:endParaRPr lang="en-US"/>
           </a:p>
@@ -1253,7 +1253,7 @@
           <a:p>
             <a:fld id="{FA0A5F52-6D2F-4552-B542-30C4C79E48C2}" type="datetimeFigureOut">
               <a:rPr lang="en-US" smtClean="0"/>
-              <a:t>11/17/2017</a:t>
+              <a:t>11/19/2017</a:t>
             </a:fld>
             <a:endParaRPr lang="en-US"/>
           </a:p>
@@ -1620,7 +1620,7 @@
           <a:p>
             <a:fld id="{FA0A5F52-6D2F-4552-B542-30C4C79E48C2}" type="datetimeFigureOut">
               <a:rPr lang="en-US" smtClean="0"/>
-              <a:t>11/17/2017</a:t>
+              <a:t>11/19/2017</a:t>
             </a:fld>
             <a:endParaRPr lang="en-US"/>
           </a:p>
@@ -1738,7 +1738,7 @@
           <a:p>
             <a:fld id="{FA0A5F52-6D2F-4552-B542-30C4C79E48C2}" type="datetimeFigureOut">
               <a:rPr lang="en-US" smtClean="0"/>
-              <a:t>11/17/2017</a:t>
+              <a:t>11/19/2017</a:t>
             </a:fld>
             <a:endParaRPr lang="en-US"/>
           </a:p>
@@ -1833,7 +1833,7 @@
           <a:p>
             <a:fld id="{FA0A5F52-6D2F-4552-B542-30C4C79E48C2}" type="datetimeFigureOut">
               <a:rPr lang="en-US" smtClean="0"/>
-              <a:t>11/17/2017</a:t>
+              <a:t>11/19/2017</a:t>
             </a:fld>
             <a:endParaRPr lang="en-US"/>
           </a:p>
@@ -2110,7 +2110,7 @@
           <a:p>
             <a:fld id="{FA0A5F52-6D2F-4552-B542-30C4C79E48C2}" type="datetimeFigureOut">
               <a:rPr lang="en-US" smtClean="0"/>
-              <a:t>11/17/2017</a:t>
+              <a:t>11/19/2017</a:t>
             </a:fld>
             <a:endParaRPr lang="en-US"/>
           </a:p>
@@ -2363,7 +2363,7 @@
           <a:p>
             <a:fld id="{FA0A5F52-6D2F-4552-B542-30C4C79E48C2}" type="datetimeFigureOut">
               <a:rPr lang="en-US" smtClean="0"/>
-              <a:t>11/17/2017</a:t>
+              <a:t>11/19/2017</a:t>
             </a:fld>
             <a:endParaRPr lang="en-US"/>
           </a:p>
@@ -2576,7 +2576,7 @@
           <a:p>
             <a:fld id="{FA0A5F52-6D2F-4552-B542-30C4C79E48C2}" type="datetimeFigureOut">
               <a:rPr lang="en-US" smtClean="0"/>
-              <a:t>11/17/2017</a:t>
+              <a:t>11/19/2017</a:t>
             </a:fld>
             <a:endParaRPr lang="en-US"/>
           </a:p>
@@ -3136,7 +3136,15 @@
             <a:pPr lvl="1"/>
             <a:r>
               <a:rPr lang="en-US" dirty="0" smtClean="0"/>
-              <a:t>n = 10 000 000.</a:t>
+              <a:t>n = </a:t>
+            </a:r>
+            <a:r>
+              <a:rPr lang="en-US" dirty="0" smtClean="0"/>
+              <a:t>100 </a:t>
+            </a:r>
+            <a:r>
+              <a:rPr lang="en-US" dirty="0" smtClean="0"/>
+              <a:t>000 000.</a:t>
             </a:r>
           </a:p>
           <a:p>
@@ -3154,14 +3162,14 @@
           <p:nvPr>
             <p:extLst>
               <p:ext uri="{D42A27DB-BD31-4B8C-83A1-F6EECF244321}">
-                <p14:modId xmlns:p14="http://schemas.microsoft.com/office/powerpoint/2010/main" val="3793266259"/>
+                <p14:modId xmlns:p14="http://schemas.microsoft.com/office/powerpoint/2010/main" val="2955075277"/>
               </p:ext>
             </p:extLst>
           </p:nvPr>
         </p:nvGraphicFramePr>
         <p:xfrm>
           <a:off x="1619116" y="4967411"/>
-          <a:ext cx="8953768" cy="741680"/>
+          <a:ext cx="8953769" cy="741680"/>
         </p:xfrm>
         <a:graphic>
           <a:graphicData uri="http://schemas.openxmlformats.org/drawingml/2006/table">
@@ -3170,12 +3178,11 @@
                 <a:tableStyleId>{5C22544A-7EE6-4342-B048-85BDC9FD1C3A}</a:tableStyleId>
               </a:tblPr>
               <a:tblGrid>
-                <a:gridCol w="2340838"/>
-                <a:gridCol w="1322586"/>
-                <a:gridCol w="1322586"/>
-                <a:gridCol w="1322586"/>
-                <a:gridCol w="1322586"/>
-                <a:gridCol w="1322586"/>
+                <a:gridCol w="2746537"/>
+                <a:gridCol w="1551808"/>
+                <a:gridCol w="1551808"/>
+                <a:gridCol w="1551808"/>
+                <a:gridCol w="1551808"/>
               </a:tblGrid>
               <a:tr h="370840">
                 <a:tc>
@@ -3256,21 +3263,6 @@
                   </a:txBody>
                   <a:tcPr/>
                 </a:tc>
-                <a:tc>
-                  <a:txBody>
-                    <a:bodyPr/>
-                    <a:lstStyle/>
-                    <a:p>
-                      <a:pPr algn="ctr"/>
-                      <a:r>
-                        <a:rPr lang="en-US" dirty="0" smtClean="0"/>
-                        <a:t>256</a:t>
-                      </a:r>
-                      <a:endParaRPr lang="en-US" dirty="0"/>
-                    </a:p>
-                  </a:txBody>
-                  <a:tcPr/>
-                </a:tc>
               </a:tr>
               <a:tr h="370840">
                 <a:tc>
@@ -3280,11 +3272,11 @@
                     <a:p>
                       <a:r>
                         <a:rPr lang="en-US" dirty="0" smtClean="0"/>
-                        <a:t>Execution time (</a:t>
+                        <a:t>Execution time </a:t>
                       </a:r>
                       <a:r>
-                        <a:rPr lang="en-US" dirty="0" err="1" smtClean="0"/>
-                        <a:t>ms</a:t>
+                        <a:rPr lang="en-US" dirty="0" smtClean="0"/>
+                        <a:t>(s</a:t>
                       </a:r>
                       <a:r>
                         <a:rPr lang="en-US" dirty="0" smtClean="0"/>
@@ -3310,7 +3302,7 @@
                           <a:ea typeface="+mn-ea"/>
                           <a:cs typeface="+mn-cs"/>
                         </a:rPr>
-                        <a:t>7304</a:t>
+                        <a:t>73.772</a:t>
                       </a:r>
                       <a:endParaRPr lang="en-US" dirty="0"/>
                     </a:p>
@@ -3332,7 +3324,7 @@
                           <a:ea typeface="+mn-ea"/>
                           <a:cs typeface="+mn-cs"/>
                         </a:rPr>
-                        <a:t>7390</a:t>
+                        <a:t>73.902</a:t>
                       </a:r>
                       <a:endParaRPr lang="en-US" dirty="0"/>
                     </a:p>
@@ -3370,7 +3362,7 @@
                           <a:ea typeface="+mn-ea"/>
                           <a:cs typeface="+mn-cs"/>
                         </a:rPr>
-                        <a:t>7374</a:t>
+                        <a:t>77.451</a:t>
                       </a:r>
                       <a:endParaRPr lang="en-US" sz="1800" kern="1200" dirty="0" smtClean="0">
                         <a:solidFill>
@@ -3399,31 +3391,16 @@
                           <a:ea typeface="+mn-ea"/>
                           <a:cs typeface="+mn-cs"/>
                         </a:rPr>
-                        <a:t>7780</a:t>
+                        <a:t>78.489</a:t>
                       </a:r>
-                      <a:endParaRPr lang="en-US" dirty="0"/>
-                    </a:p>
-                  </a:txBody>
-                  <a:tcPr/>
-                </a:tc>
-                <a:tc>
-                  <a:txBody>
-                    <a:bodyPr/>
-                    <a:lstStyle/>
-                    <a:p>
-                      <a:pPr algn="ctr"/>
-                      <a:r>
-                        <a:rPr lang="en-US" sz="1800" kern="1200" dirty="0" smtClean="0">
-                          <a:solidFill>
-                            <a:schemeClr val="dk1"/>
-                          </a:solidFill>
-                          <a:latin typeface="+mn-lt"/>
-                          <a:ea typeface="+mn-ea"/>
-                          <a:cs typeface="+mn-cs"/>
-                        </a:rPr>
-                        <a:t>13523</a:t>
-                      </a:r>
-                      <a:endParaRPr lang="en-US" dirty="0"/>
+                      <a:endParaRPr lang="en-US" sz="1800" kern="1200" dirty="0" smtClean="0">
+                        <a:solidFill>
+                          <a:schemeClr val="dk1"/>
+                        </a:solidFill>
+                        <a:latin typeface="+mn-lt"/>
+                        <a:ea typeface="+mn-ea"/>
+                        <a:cs typeface="+mn-cs"/>
+                      </a:endParaRPr>
                     </a:p>
                   </a:txBody>
                   <a:tcPr/>
@@ -3442,14 +3419,14 @@
           <p:nvPr>
             <p:extLst>
               <p:ext uri="{D42A27DB-BD31-4B8C-83A1-F6EECF244321}">
-                <p14:modId xmlns:p14="http://schemas.microsoft.com/office/powerpoint/2010/main" val="198889536"/>
+                <p14:modId xmlns:p14="http://schemas.microsoft.com/office/powerpoint/2010/main" val="3125791347"/>
               </p:ext>
             </p:extLst>
           </p:nvPr>
         </p:nvGraphicFramePr>
         <p:xfrm>
-          <a:off x="1619116" y="2803996"/>
-          <a:ext cx="8953768" cy="741680"/>
+          <a:off x="1619115" y="2803996"/>
+          <a:ext cx="8953769" cy="741680"/>
         </p:xfrm>
         <a:graphic>
           <a:graphicData uri="http://schemas.openxmlformats.org/drawingml/2006/table">
@@ -3458,12 +3435,11 @@
                 <a:tableStyleId>{5C22544A-7EE6-4342-B048-85BDC9FD1C3A}</a:tableStyleId>
               </a:tblPr>
               <a:tblGrid>
-                <a:gridCol w="2340838"/>
-                <a:gridCol w="1322586"/>
-                <a:gridCol w="1322586"/>
-                <a:gridCol w="1322586"/>
-                <a:gridCol w="1322586"/>
-                <a:gridCol w="1322586"/>
+                <a:gridCol w="2746537"/>
+                <a:gridCol w="1551808"/>
+                <a:gridCol w="1551808"/>
+                <a:gridCol w="1551808"/>
+                <a:gridCol w="1551808"/>
               </a:tblGrid>
               <a:tr h="370840">
                 <a:tc>
@@ -3544,21 +3520,6 @@
                   </a:txBody>
                   <a:tcPr/>
                 </a:tc>
-                <a:tc>
-                  <a:txBody>
-                    <a:bodyPr/>
-                    <a:lstStyle/>
-                    <a:p>
-                      <a:pPr algn="ctr"/>
-                      <a:r>
-                        <a:rPr lang="en-US" dirty="0" smtClean="0"/>
-                        <a:t>16n/256</a:t>
-                      </a:r>
-                      <a:endParaRPr lang="en-US" dirty="0"/>
-                    </a:p>
-                  </a:txBody>
-                  <a:tcPr/>
-                </a:tc>
               </a:tr>
               <a:tr h="370840">
                 <a:tc>
@@ -3568,11 +3529,11 @@
                     <a:p>
                       <a:r>
                         <a:rPr lang="en-US" dirty="0" smtClean="0"/>
-                        <a:t>Execution time (</a:t>
+                        <a:t>Execution time </a:t>
                       </a:r>
                       <a:r>
-                        <a:rPr lang="en-US" dirty="0" err="1" smtClean="0"/>
-                        <a:t>ms</a:t>
+                        <a:rPr lang="en-US" dirty="0" smtClean="0"/>
+                        <a:t>(s</a:t>
                       </a:r>
                       <a:r>
                         <a:rPr lang="en-US" dirty="0" smtClean="0"/>
@@ -3598,7 +3559,7 @@
                           <a:ea typeface="+mn-ea"/>
                           <a:cs typeface="+mn-cs"/>
                         </a:rPr>
-                        <a:t>752</a:t>
+                        <a:t>17.931</a:t>
                       </a:r>
                       <a:endParaRPr lang="en-US" dirty="0"/>
                     </a:p>
@@ -3620,7 +3581,7 @@
                           <a:ea typeface="+mn-ea"/>
                           <a:cs typeface="+mn-cs"/>
                         </a:rPr>
-                        <a:t>1452</a:t>
+                        <a:t>36.884</a:t>
                       </a:r>
                       <a:endParaRPr lang="en-US" dirty="0"/>
                     </a:p>
@@ -3642,7 +3603,7 @@
                           <a:ea typeface="+mn-ea"/>
                           <a:cs typeface="+mn-cs"/>
                         </a:rPr>
-                        <a:t>2917</a:t>
+                        <a:t>76.407</a:t>
                       </a:r>
                       <a:endParaRPr lang="en-US" dirty="0"/>
                     </a:p>
@@ -3664,29 +3625,7 @@
                           <a:ea typeface="+mn-ea"/>
                           <a:cs typeface="+mn-cs"/>
                         </a:rPr>
-                        <a:t>5920</a:t>
-                      </a:r>
-                      <a:endParaRPr lang="en-US" dirty="0"/>
-                    </a:p>
-                  </a:txBody>
-                  <a:tcPr/>
-                </a:tc>
-                <a:tc>
-                  <a:txBody>
-                    <a:bodyPr/>
-                    <a:lstStyle/>
-                    <a:p>
-                      <a:pPr algn="ctr"/>
-                      <a:r>
-                        <a:rPr lang="en-US" sz="1800" kern="1200" dirty="0" smtClean="0">
-                          <a:solidFill>
-                            <a:schemeClr val="dk1"/>
-                          </a:solidFill>
-                          <a:latin typeface="+mn-lt"/>
-                          <a:ea typeface="+mn-ea"/>
-                          <a:cs typeface="+mn-cs"/>
-                        </a:rPr>
-                        <a:t>19458</a:t>
+                        <a:t>149.951</a:t>
                       </a:r>
                       <a:endParaRPr lang="en-US" dirty="0"/>
                     </a:p>
@@ -4469,7 +4408,15 @@
             <a:pPr lvl="1"/>
             <a:r>
               <a:rPr lang="en-US" dirty="0" smtClean="0"/>
-              <a:t>n = 1 000 000</a:t>
+              <a:t>n = </a:t>
+            </a:r>
+            <a:r>
+              <a:rPr lang="en-US" dirty="0" smtClean="0"/>
+              <a:t>1 000 </a:t>
+            </a:r>
+            <a:r>
+              <a:rPr lang="en-US" dirty="0" smtClean="0"/>
+              <a:t>000 000</a:t>
             </a:r>
           </a:p>
           <a:p>
@@ -4488,7 +4435,15 @@
             <a:pPr lvl="1"/>
             <a:r>
               <a:rPr lang="en-US" dirty="0" smtClean="0"/>
-              <a:t>n = 10 000 000.</a:t>
+              <a:t>n = </a:t>
+            </a:r>
+            <a:r>
+              <a:rPr lang="en-US" dirty="0" smtClean="0"/>
+              <a:t>1 000 </a:t>
+            </a:r>
+            <a:r>
+              <a:rPr lang="en-US" dirty="0" smtClean="0"/>
+              <a:t>000 000.</a:t>
             </a:r>
           </a:p>
           <a:p>
@@ -4506,13 +4461,13 @@
           <p:nvPr>
             <p:extLst>
               <p:ext uri="{D42A27DB-BD31-4B8C-83A1-F6EECF244321}">
-                <p14:modId xmlns:p14="http://schemas.microsoft.com/office/powerpoint/2010/main" val="1746667613"/>
+                <p14:modId xmlns:p14="http://schemas.microsoft.com/office/powerpoint/2010/main" val="1190438933"/>
               </p:ext>
             </p:extLst>
           </p:nvPr>
         </p:nvGraphicFramePr>
         <p:xfrm>
-          <a:off x="1619116" y="2803996"/>
+          <a:off x="1619114" y="2803996"/>
           <a:ext cx="8953768" cy="741680"/>
         </p:xfrm>
         <a:graphic>
@@ -4522,12 +4477,11 @@
                 <a:tableStyleId>{5C22544A-7EE6-4342-B048-85BDC9FD1C3A}</a:tableStyleId>
               </a:tblPr>
               <a:tblGrid>
-                <a:gridCol w="2340838"/>
-                <a:gridCol w="1322586"/>
-                <a:gridCol w="1322586"/>
-                <a:gridCol w="1322586"/>
-                <a:gridCol w="1322586"/>
-                <a:gridCol w="1322586"/>
+                <a:gridCol w="2746536"/>
+                <a:gridCol w="1551808"/>
+                <a:gridCol w="1551808"/>
+                <a:gridCol w="1551808"/>
+                <a:gridCol w="1551808"/>
               </a:tblGrid>
               <a:tr h="370840">
                 <a:tc>
@@ -4608,21 +4562,6 @@
                   </a:txBody>
                   <a:tcPr/>
                 </a:tc>
-                <a:tc>
-                  <a:txBody>
-                    <a:bodyPr/>
-                    <a:lstStyle/>
-                    <a:p>
-                      <a:pPr algn="ctr"/>
-                      <a:r>
-                        <a:rPr lang="en-US" dirty="0" smtClean="0"/>
-                        <a:t>16n/256</a:t>
-                      </a:r>
-                      <a:endParaRPr lang="en-US" dirty="0"/>
-                    </a:p>
-                  </a:txBody>
-                  <a:tcPr/>
-                </a:tc>
               </a:tr>
               <a:tr h="370840">
                 <a:tc>
@@ -4632,103 +4571,15 @@
                     <a:p>
                       <a:r>
                         <a:rPr lang="en-US" dirty="0" smtClean="0"/>
-                        <a:t>Execution time (</a:t>
+                        <a:t>Execution time </a:t>
                       </a:r>
                       <a:r>
-                        <a:rPr lang="en-US" dirty="0" err="1" smtClean="0"/>
-                        <a:t>ms</a:t>
+                        <a:rPr lang="en-US" dirty="0" smtClean="0"/>
+                        <a:t>(s</a:t>
                       </a:r>
                       <a:r>
                         <a:rPr lang="en-US" dirty="0" smtClean="0"/>
                         <a:t>)</a:t>
-                      </a:r>
-                      <a:endParaRPr lang="en-US" dirty="0"/>
-                    </a:p>
-                  </a:txBody>
-                  <a:tcPr/>
-                </a:tc>
-                <a:tc>
-                  <a:txBody>
-                    <a:bodyPr/>
-                    <a:lstStyle/>
-                    <a:p>
-                      <a:pPr algn="ctr"/>
-                      <a:r>
-                        <a:rPr lang="en-US" sz="1800" kern="1200" dirty="0" smtClean="0">
-                          <a:solidFill>
-                            <a:schemeClr val="dk1"/>
-                          </a:solidFill>
-                          <a:latin typeface="+mn-lt"/>
-                          <a:ea typeface="+mn-ea"/>
-                          <a:cs typeface="+mn-cs"/>
-                        </a:rPr>
-                        <a:t>31</a:t>
-                      </a:r>
-                      <a:endParaRPr lang="en-US" dirty="0"/>
-                    </a:p>
-                  </a:txBody>
-                  <a:tcPr/>
-                </a:tc>
-                <a:tc>
-                  <a:txBody>
-                    <a:bodyPr/>
-                    <a:lstStyle/>
-                    <a:p>
-                      <a:pPr algn="ctr"/>
-                      <a:r>
-                        <a:rPr lang="en-US" sz="1800" kern="1200" dirty="0" smtClean="0">
-                          <a:solidFill>
-                            <a:schemeClr val="dk1"/>
-                          </a:solidFill>
-                          <a:latin typeface="+mn-lt"/>
-                          <a:ea typeface="+mn-ea"/>
-                          <a:cs typeface="+mn-cs"/>
-                        </a:rPr>
-                        <a:t>37</a:t>
-                      </a:r>
-                      <a:endParaRPr lang="en-US" dirty="0"/>
-                    </a:p>
-                  </a:txBody>
-                  <a:tcPr/>
-                </a:tc>
-                <a:tc>
-                  <a:txBody>
-                    <a:bodyPr/>
-                    <a:lstStyle/>
-                    <a:p>
-                      <a:pPr algn="ctr"/>
-                      <a:r>
-                        <a:rPr lang="en-US" sz="1800" kern="1200" dirty="0" smtClean="0">
-                          <a:solidFill>
-                            <a:schemeClr val="dk1"/>
-                          </a:solidFill>
-                          <a:latin typeface="+mn-lt"/>
-                          <a:ea typeface="+mn-ea"/>
-                          <a:cs typeface="+mn-cs"/>
-                        </a:rPr>
-                        <a:t>50</a:t>
-                      </a:r>
-                      <a:endParaRPr lang="en-US" dirty="0"/>
-                    </a:p>
-                  </a:txBody>
-                  <a:tcPr/>
-                </a:tc>
-                <a:tc>
-                  <a:txBody>
-                    <a:bodyPr/>
-                    <a:lstStyle/>
-                    <a:p>
-                      <a:pPr algn="ctr"/>
-                      <a:r>
-                        <a:rPr lang="en-US" sz="1800" kern="1200" dirty="0" smtClean="0">
-                          <a:solidFill>
-                            <a:schemeClr val="dk1"/>
-                          </a:solidFill>
-                          <a:latin typeface="+mn-lt"/>
-                          <a:ea typeface="+mn-ea"/>
-                          <a:cs typeface="+mn-cs"/>
-                        </a:rPr>
-                        <a:t>73</a:t>
                       </a:r>
                       <a:endParaRPr lang="en-US" dirty="0"/>
                     </a:p>
@@ -4766,8 +4617,89 @@
                           <a:ea typeface="+mn-ea"/>
                           <a:cs typeface="+mn-cs"/>
                         </a:rPr>
-                        <a:t>209</a:t>
+                        <a:t>0.176</a:t>
                       </a:r>
+                    </a:p>
+                  </a:txBody>
+                  <a:tcPr/>
+                </a:tc>
+                <a:tc>
+                  <a:txBody>
+                    <a:bodyPr/>
+                    <a:lstStyle/>
+                    <a:p>
+                      <a:pPr marL="0" marR="0" lvl="0" indent="0" algn="ctr" defTabSz="914400" rtl="0" eaLnBrk="1" fontAlgn="auto" latinLnBrk="0" hangingPunct="1">
+                        <a:lnSpc>
+                          <a:spcPct val="100000"/>
+                        </a:lnSpc>
+                        <a:spcBef>
+                          <a:spcPts val="0"/>
+                        </a:spcBef>
+                        <a:spcAft>
+                          <a:spcPts val="0"/>
+                        </a:spcAft>
+                        <a:buClrTx/>
+                        <a:buSzTx/>
+                        <a:buFontTx/>
+                        <a:buNone/>
+                        <a:tabLst/>
+                        <a:defRPr/>
+                      </a:pPr>
+                      <a:r>
+                        <a:rPr lang="en-US" sz="1800" kern="1200" dirty="0" smtClean="0">
+                          <a:solidFill>
+                            <a:schemeClr val="dk1"/>
+                          </a:solidFill>
+                          <a:latin typeface="+mn-lt"/>
+                          <a:ea typeface="+mn-ea"/>
+                          <a:cs typeface="+mn-cs"/>
+                        </a:rPr>
+                        <a:t>0.181</a:t>
+                      </a:r>
+                    </a:p>
+                  </a:txBody>
+                  <a:tcPr/>
+                </a:tc>
+                <a:tc>
+                  <a:txBody>
+                    <a:bodyPr/>
+                    <a:lstStyle/>
+                    <a:p>
+                      <a:pPr algn="ctr"/>
+                      <a:r>
+                        <a:rPr lang="en-US" sz="1800" kern="1200" dirty="0" smtClean="0">
+                          <a:solidFill>
+                            <a:schemeClr val="dk1"/>
+                          </a:solidFill>
+                          <a:latin typeface="+mn-lt"/>
+                          <a:ea typeface="+mn-ea"/>
+                          <a:cs typeface="+mn-cs"/>
+                        </a:rPr>
+                        <a:t>0.202</a:t>
+                      </a:r>
+                      <a:endParaRPr lang="en-US" dirty="0"/>
+                    </a:p>
+                  </a:txBody>
+                  <a:tcPr/>
+                </a:tc>
+                <a:tc>
+                  <a:txBody>
+                    <a:bodyPr/>
+                    <a:lstStyle/>
+                    <a:p>
+                      <a:pPr algn="ctr"/>
+                      <a:r>
+                        <a:rPr lang="en-US" sz="1800" kern="1200" dirty="0" smtClean="0">
+                          <a:solidFill>
+                            <a:schemeClr val="dk1"/>
+                          </a:solidFill>
+                          <a:latin typeface="+mn-lt"/>
+                          <a:ea typeface="+mn-ea"/>
+                          <a:cs typeface="+mn-cs"/>
+                        </a:rPr>
+                        <a:t>0.302</a:t>
+                      </a:r>
+                      <a:endParaRPr lang="en-US" dirty="0"/>
                     </a:p>
                   </a:txBody>
                   <a:tcPr/>
@@ -4786,14 +4718,14 @@
           <p:nvPr>
             <p:extLst>
               <p:ext uri="{D42A27DB-BD31-4B8C-83A1-F6EECF244321}">
-                <p14:modId xmlns:p14="http://schemas.microsoft.com/office/powerpoint/2010/main" val="2115578463"/>
+                <p14:modId xmlns:p14="http://schemas.microsoft.com/office/powerpoint/2010/main" val="1119805930"/>
               </p:ext>
             </p:extLst>
           </p:nvPr>
         </p:nvGraphicFramePr>
         <p:xfrm>
-          <a:off x="1616955" y="4883105"/>
-          <a:ext cx="8953768" cy="741680"/>
+          <a:off x="1616956" y="4883105"/>
+          <a:ext cx="8955927" cy="741680"/>
         </p:xfrm>
         <a:graphic>
           <a:graphicData uri="http://schemas.openxmlformats.org/drawingml/2006/table">
@@ -4802,12 +4734,11 @@
                 <a:tableStyleId>{5C22544A-7EE6-4342-B048-85BDC9FD1C3A}</a:tableStyleId>
               </a:tblPr>
               <a:tblGrid>
-                <a:gridCol w="2340838"/>
-                <a:gridCol w="1322586"/>
-                <a:gridCol w="1322586"/>
-                <a:gridCol w="1322586"/>
-                <a:gridCol w="1322586"/>
-                <a:gridCol w="1322586"/>
+                <a:gridCol w="2747199"/>
+                <a:gridCol w="1552182"/>
+                <a:gridCol w="1552182"/>
+                <a:gridCol w="1552182"/>
+                <a:gridCol w="1552182"/>
               </a:tblGrid>
               <a:tr h="370840">
                 <a:tc>
@@ -4888,21 +4819,6 @@
                   </a:txBody>
                   <a:tcPr/>
                 </a:tc>
-                <a:tc>
-                  <a:txBody>
-                    <a:bodyPr/>
-                    <a:lstStyle/>
-                    <a:p>
-                      <a:pPr algn="ctr"/>
-                      <a:r>
-                        <a:rPr lang="en-US" dirty="0" smtClean="0"/>
-                        <a:t>256</a:t>
-                      </a:r>
-                      <a:endParaRPr lang="en-US" dirty="0"/>
-                    </a:p>
-                  </a:txBody>
-                  <a:tcPr/>
-                </a:tc>
               </a:tr>
               <a:tr h="370840">
                 <a:tc>
@@ -4912,11 +4828,11 @@
                     <a:p>
                       <a:r>
                         <a:rPr lang="en-US" dirty="0" smtClean="0"/>
-                        <a:t>Execution time (</a:t>
+                        <a:t>Execution time </a:t>
                       </a:r>
                       <a:r>
-                        <a:rPr lang="en-US" dirty="0" err="1" smtClean="0"/>
-                        <a:t>ms</a:t>
+                        <a:rPr lang="en-US" dirty="0" smtClean="0"/>
+                        <a:t>(s</a:t>
                       </a:r>
                       <a:r>
                         <a:rPr lang="en-US" dirty="0" smtClean="0"/>
@@ -4942,7 +4858,7 @@
                           <a:ea typeface="+mn-ea"/>
                           <a:cs typeface="+mn-cs"/>
                         </a:rPr>
-                        <a:t>35</a:t>
+                        <a:t>0.610</a:t>
                       </a:r>
                       <a:endParaRPr lang="en-US" dirty="0"/>
                     </a:p>
@@ -4980,7 +4896,7 @@
                           <a:ea typeface="+mn-ea"/>
                           <a:cs typeface="+mn-cs"/>
                         </a:rPr>
-                        <a:t>36</a:t>
+                        <a:t>0.325</a:t>
                       </a:r>
                       <a:endParaRPr lang="en-US" sz="1800" kern="1200" dirty="0" smtClean="0">
                         <a:solidFill>
@@ -5009,7 +4925,7 @@
                           <a:ea typeface="+mn-ea"/>
                           <a:cs typeface="+mn-cs"/>
                         </a:rPr>
-                        <a:t>47</a:t>
+                        <a:t>0.196</a:t>
                       </a:r>
                       <a:endParaRPr lang="en-US" dirty="0"/>
                     </a:p>
@@ -5031,29 +4947,7 @@
                           <a:ea typeface="+mn-ea"/>
                           <a:cs typeface="+mn-cs"/>
                         </a:rPr>
-                        <a:t>69</a:t>
-                      </a:r>
-                      <a:endParaRPr lang="en-US" dirty="0"/>
-                    </a:p>
-                  </a:txBody>
-                  <a:tcPr/>
-                </a:tc>
-                <a:tc>
-                  <a:txBody>
-                    <a:bodyPr/>
-                    <a:lstStyle/>
-                    <a:p>
-                      <a:pPr algn="ctr"/>
-                      <a:r>
-                        <a:rPr lang="en-US" sz="1800" kern="1200" dirty="0" smtClean="0">
-                          <a:solidFill>
-                            <a:schemeClr val="dk1"/>
-                          </a:solidFill>
-                          <a:latin typeface="+mn-lt"/>
-                          <a:ea typeface="+mn-ea"/>
-                          <a:cs typeface="+mn-cs"/>
-                        </a:rPr>
-                        <a:t>113</a:t>
+                        <a:t>0.188</a:t>
                       </a:r>
                       <a:endParaRPr lang="en-US" dirty="0"/>
                     </a:p>
@@ -5139,6 +5033,39 @@
         <p:txBody>
           <a:bodyPr/>
           <a:lstStyle/>
+          <a:p>
+            <a:pPr fontAlgn="base"/>
+            <a:r>
+              <a:rPr lang="en-US" dirty="0"/>
+              <a:t>Using the critical directive kills performance because threads have to access the critical section one after another.</a:t>
+            </a:r>
+          </a:p>
+          <a:p>
+            <a:pPr fontAlgn="base"/>
+            <a:r>
+              <a:rPr lang="en-US" dirty="0"/>
+              <a:t>Parallelizing with the reduction clause leads to faster execution once more threads are introduced</a:t>
+            </a:r>
+            <a:r>
+              <a:rPr lang="en-US" dirty="0" smtClean="0"/>
+              <a:t>.</a:t>
+            </a:r>
+          </a:p>
+          <a:p>
+            <a:pPr fontAlgn="base"/>
+            <a:endParaRPr lang="en-US" dirty="0"/>
+          </a:p>
+          <a:p>
+            <a:pPr fontAlgn="base"/>
+            <a:r>
+              <a:rPr lang="en-US" dirty="0" smtClean="0"/>
+              <a:t>Strong </a:t>
+            </a:r>
+            <a:r>
+              <a:rPr lang="en-US" dirty="0"/>
+              <a:t>scaling shows that if the problem is big enough adding more threads to parallelize it works up to a certain point. It will have diminishing returns once the problem chunks are so small that the overhead of adding more threads doesn’t help anymore.</a:t>
+            </a:r>
+          </a:p>
           <a:p>
             <a:endParaRPr lang="en-US" dirty="0"/>
           </a:p>

</xml_diff>